<commit_message>
Sir 06 neue Lizenz eingepflegt
</commit_message>
<xml_diff>
--- a/training-cards/music moves/Scrum (SCR)/ger/apprentice/ger_SCR_06_Zeit_zum_Wachsen_MM_A.pptx
+++ b/training-cards/music moves/Scrum (SCR)/ger/apprentice/ger_SCR_06_Zeit_zum_Wachsen_MM_A.pptx
@@ -162,10 +162,9 @@
           <a:lstStyle/>
           <a:p>
             <a:r>
-              <a:rPr lang="de-DE" smtClean="0"/>
+              <a:rPr lang="de-DE"/>
               <a:t>Mastertitelformat bearbeiten</a:t>
             </a:r>
-            <a:endParaRPr lang="de-DE"/>
           </a:p>
         </p:txBody>
       </p:sp>
@@ -281,10 +280,9 @@
           </a:lstStyle>
           <a:p>
             <a:r>
-              <a:rPr lang="de-DE" smtClean="0"/>
+              <a:rPr lang="de-DE"/>
               <a:t>Master-Untertitelformat bearbeiten</a:t>
             </a:r>
-            <a:endParaRPr lang="de-DE"/>
           </a:p>
         </p:txBody>
       </p:sp>
@@ -305,7 +303,7 @@
           <a:p>
             <a:fld id="{B4A60231-500B-C44A-9B19-425C835AF47F}" type="datetimeFigureOut">
               <a:rPr lang="de-DE" smtClean="0"/>
-              <a:t>22.02.16</a:t>
+              <a:t>23.07.23</a:t>
             </a:fld>
             <a:endParaRPr lang="de-DE"/>
           </a:p>
@@ -399,10 +397,9 @@
           <a:lstStyle/>
           <a:p>
             <a:r>
-              <a:rPr lang="de-DE" smtClean="0"/>
+              <a:rPr lang="de-DE"/>
               <a:t>Mastertitelformat bearbeiten</a:t>
             </a:r>
-            <a:endParaRPr lang="de-DE"/>
           </a:p>
         </p:txBody>
       </p:sp>
@@ -423,38 +420,37 @@
           <a:p>
             <a:pPr lvl="0"/>
             <a:r>
-              <a:rPr lang="de-DE" smtClean="0"/>
+              <a:rPr lang="de-DE"/>
               <a:t>Mastertextformat bearbeiten</a:t>
             </a:r>
           </a:p>
           <a:p>
             <a:pPr lvl="1"/>
             <a:r>
-              <a:rPr lang="de-DE" smtClean="0"/>
+              <a:rPr lang="de-DE"/>
               <a:t>Zweite Ebene</a:t>
             </a:r>
           </a:p>
           <a:p>
             <a:pPr lvl="2"/>
             <a:r>
-              <a:rPr lang="de-DE" smtClean="0"/>
+              <a:rPr lang="de-DE"/>
               <a:t>Dritte Ebene</a:t>
             </a:r>
           </a:p>
           <a:p>
             <a:pPr lvl="3"/>
             <a:r>
-              <a:rPr lang="de-DE" smtClean="0"/>
+              <a:rPr lang="de-DE"/>
               <a:t>Vierte Ebene</a:t>
             </a:r>
           </a:p>
           <a:p>
             <a:pPr lvl="4"/>
             <a:r>
-              <a:rPr lang="de-DE" smtClean="0"/>
+              <a:rPr lang="de-DE"/>
               <a:t>Fünfte Ebene</a:t>
             </a:r>
-            <a:endParaRPr lang="de-DE"/>
           </a:p>
         </p:txBody>
       </p:sp>
@@ -475,7 +471,7 @@
           <a:p>
             <a:fld id="{B4A60231-500B-C44A-9B19-425C835AF47F}" type="datetimeFigureOut">
               <a:rPr lang="de-DE" smtClean="0"/>
-              <a:t>22.02.16</a:t>
+              <a:t>23.07.23</a:t>
             </a:fld>
             <a:endParaRPr lang="de-DE"/>
           </a:p>
@@ -574,10 +570,9 @@
           <a:lstStyle/>
           <a:p>
             <a:r>
-              <a:rPr lang="de-DE" smtClean="0"/>
+              <a:rPr lang="de-DE"/>
               <a:t>Mastertitelformat bearbeiten</a:t>
             </a:r>
-            <a:endParaRPr lang="de-DE"/>
           </a:p>
         </p:txBody>
       </p:sp>
@@ -603,38 +598,37 @@
           <a:p>
             <a:pPr lvl="0"/>
             <a:r>
-              <a:rPr lang="de-DE" smtClean="0"/>
+              <a:rPr lang="de-DE"/>
               <a:t>Mastertextformat bearbeiten</a:t>
             </a:r>
           </a:p>
           <a:p>
             <a:pPr lvl="1"/>
             <a:r>
-              <a:rPr lang="de-DE" smtClean="0"/>
+              <a:rPr lang="de-DE"/>
               <a:t>Zweite Ebene</a:t>
             </a:r>
           </a:p>
           <a:p>
             <a:pPr lvl="2"/>
             <a:r>
-              <a:rPr lang="de-DE" smtClean="0"/>
+              <a:rPr lang="de-DE"/>
               <a:t>Dritte Ebene</a:t>
             </a:r>
           </a:p>
           <a:p>
             <a:pPr lvl="3"/>
             <a:r>
-              <a:rPr lang="de-DE" smtClean="0"/>
+              <a:rPr lang="de-DE"/>
               <a:t>Vierte Ebene</a:t>
             </a:r>
           </a:p>
           <a:p>
             <a:pPr lvl="4"/>
             <a:r>
-              <a:rPr lang="de-DE" smtClean="0"/>
+              <a:rPr lang="de-DE"/>
               <a:t>Fünfte Ebene</a:t>
             </a:r>
-            <a:endParaRPr lang="de-DE"/>
           </a:p>
         </p:txBody>
       </p:sp>
@@ -655,7 +649,7 @@
           <a:p>
             <a:fld id="{B4A60231-500B-C44A-9B19-425C835AF47F}" type="datetimeFigureOut">
               <a:rPr lang="de-DE" smtClean="0"/>
-              <a:t>22.02.16</a:t>
+              <a:t>23.07.23</a:t>
             </a:fld>
             <a:endParaRPr lang="de-DE"/>
           </a:p>
@@ -749,10 +743,9 @@
           <a:lstStyle/>
           <a:p>
             <a:r>
-              <a:rPr lang="de-DE" smtClean="0"/>
+              <a:rPr lang="de-DE"/>
               <a:t>Mastertitelformat bearbeiten</a:t>
             </a:r>
-            <a:endParaRPr lang="de-DE"/>
           </a:p>
         </p:txBody>
       </p:sp>
@@ -773,38 +766,37 @@
           <a:p>
             <a:pPr lvl="0"/>
             <a:r>
-              <a:rPr lang="de-DE" smtClean="0"/>
+              <a:rPr lang="de-DE"/>
               <a:t>Mastertextformat bearbeiten</a:t>
             </a:r>
           </a:p>
           <a:p>
             <a:pPr lvl="1"/>
             <a:r>
-              <a:rPr lang="de-DE" smtClean="0"/>
+              <a:rPr lang="de-DE"/>
               <a:t>Zweite Ebene</a:t>
             </a:r>
           </a:p>
           <a:p>
             <a:pPr lvl="2"/>
             <a:r>
-              <a:rPr lang="de-DE" smtClean="0"/>
+              <a:rPr lang="de-DE"/>
               <a:t>Dritte Ebene</a:t>
             </a:r>
           </a:p>
           <a:p>
             <a:pPr lvl="3"/>
             <a:r>
-              <a:rPr lang="de-DE" smtClean="0"/>
+              <a:rPr lang="de-DE"/>
               <a:t>Vierte Ebene</a:t>
             </a:r>
           </a:p>
           <a:p>
             <a:pPr lvl="4"/>
             <a:r>
-              <a:rPr lang="de-DE" smtClean="0"/>
+              <a:rPr lang="de-DE"/>
               <a:t>Fünfte Ebene</a:t>
             </a:r>
-            <a:endParaRPr lang="de-DE"/>
           </a:p>
         </p:txBody>
       </p:sp>
@@ -825,7 +817,7 @@
           <a:p>
             <a:fld id="{B4A60231-500B-C44A-9B19-425C835AF47F}" type="datetimeFigureOut">
               <a:rPr lang="de-DE" smtClean="0"/>
-              <a:t>22.02.16</a:t>
+              <a:t>23.07.23</a:t>
             </a:fld>
             <a:endParaRPr lang="de-DE"/>
           </a:p>
@@ -928,10 +920,9 @@
           </a:lstStyle>
           <a:p>
             <a:r>
-              <a:rPr lang="de-DE" smtClean="0"/>
+              <a:rPr lang="de-DE"/>
               <a:t>Mastertitelformat bearbeiten</a:t>
             </a:r>
-            <a:endParaRPr lang="de-DE"/>
           </a:p>
         </p:txBody>
       </p:sp>
@@ -1048,7 +1039,7 @@
           <a:p>
             <a:pPr lvl="0"/>
             <a:r>
-              <a:rPr lang="de-DE" smtClean="0"/>
+              <a:rPr lang="de-DE"/>
               <a:t>Mastertextformat bearbeiten</a:t>
             </a:r>
           </a:p>
@@ -1071,7 +1062,7 @@
           <a:p>
             <a:fld id="{B4A60231-500B-C44A-9B19-425C835AF47F}" type="datetimeFigureOut">
               <a:rPr lang="de-DE" smtClean="0"/>
-              <a:t>22.02.16</a:t>
+              <a:t>23.07.23</a:t>
             </a:fld>
             <a:endParaRPr lang="de-DE"/>
           </a:p>
@@ -1165,10 +1156,9 @@
           <a:lstStyle/>
           <a:p>
             <a:r>
-              <a:rPr lang="de-DE" smtClean="0"/>
+              <a:rPr lang="de-DE"/>
               <a:t>Mastertitelformat bearbeiten</a:t>
             </a:r>
-            <a:endParaRPr lang="de-DE"/>
           </a:p>
         </p:txBody>
       </p:sp>
@@ -1222,38 +1212,37 @@
           <a:p>
             <a:pPr lvl="0"/>
             <a:r>
-              <a:rPr lang="de-DE" smtClean="0"/>
+              <a:rPr lang="de-DE"/>
               <a:t>Mastertextformat bearbeiten</a:t>
             </a:r>
           </a:p>
           <a:p>
             <a:pPr lvl="1"/>
             <a:r>
-              <a:rPr lang="de-DE" smtClean="0"/>
+              <a:rPr lang="de-DE"/>
               <a:t>Zweite Ebene</a:t>
             </a:r>
           </a:p>
           <a:p>
             <a:pPr lvl="2"/>
             <a:r>
-              <a:rPr lang="de-DE" smtClean="0"/>
+              <a:rPr lang="de-DE"/>
               <a:t>Dritte Ebene</a:t>
             </a:r>
           </a:p>
           <a:p>
             <a:pPr lvl="3"/>
             <a:r>
-              <a:rPr lang="de-DE" smtClean="0"/>
+              <a:rPr lang="de-DE"/>
               <a:t>Vierte Ebene</a:t>
             </a:r>
           </a:p>
           <a:p>
             <a:pPr lvl="4"/>
             <a:r>
-              <a:rPr lang="de-DE" smtClean="0"/>
+              <a:rPr lang="de-DE"/>
               <a:t>Fünfte Ebene</a:t>
             </a:r>
-            <a:endParaRPr lang="de-DE"/>
           </a:p>
         </p:txBody>
       </p:sp>
@@ -1307,38 +1296,37 @@
           <a:p>
             <a:pPr lvl="0"/>
             <a:r>
-              <a:rPr lang="de-DE" smtClean="0"/>
+              <a:rPr lang="de-DE"/>
               <a:t>Mastertextformat bearbeiten</a:t>
             </a:r>
           </a:p>
           <a:p>
             <a:pPr lvl="1"/>
             <a:r>
-              <a:rPr lang="de-DE" smtClean="0"/>
+              <a:rPr lang="de-DE"/>
               <a:t>Zweite Ebene</a:t>
             </a:r>
           </a:p>
           <a:p>
             <a:pPr lvl="2"/>
             <a:r>
-              <a:rPr lang="de-DE" smtClean="0"/>
+              <a:rPr lang="de-DE"/>
               <a:t>Dritte Ebene</a:t>
             </a:r>
           </a:p>
           <a:p>
             <a:pPr lvl="3"/>
             <a:r>
-              <a:rPr lang="de-DE" smtClean="0"/>
+              <a:rPr lang="de-DE"/>
               <a:t>Vierte Ebene</a:t>
             </a:r>
           </a:p>
           <a:p>
             <a:pPr lvl="4"/>
             <a:r>
-              <a:rPr lang="de-DE" smtClean="0"/>
+              <a:rPr lang="de-DE"/>
               <a:t>Fünfte Ebene</a:t>
             </a:r>
-            <a:endParaRPr lang="de-DE"/>
           </a:p>
         </p:txBody>
       </p:sp>
@@ -1359,7 +1347,7 @@
           <a:p>
             <a:fld id="{B4A60231-500B-C44A-9B19-425C835AF47F}" type="datetimeFigureOut">
               <a:rPr lang="de-DE" smtClean="0"/>
-              <a:t>22.02.16</a:t>
+              <a:t>23.07.23</a:t>
             </a:fld>
             <a:endParaRPr lang="de-DE"/>
           </a:p>
@@ -1457,10 +1445,9 @@
           </a:lstStyle>
           <a:p>
             <a:r>
-              <a:rPr lang="de-DE" smtClean="0"/>
+              <a:rPr lang="de-DE"/>
               <a:t>Mastertitelformat bearbeiten</a:t>
             </a:r>
-            <a:endParaRPr lang="de-DE"/>
           </a:p>
         </p:txBody>
       </p:sp>
@@ -1523,7 +1510,7 @@
           <a:p>
             <a:pPr lvl="0"/>
             <a:r>
-              <a:rPr lang="de-DE" smtClean="0"/>
+              <a:rPr lang="de-DE"/>
               <a:t>Mastertextformat bearbeiten</a:t>
             </a:r>
           </a:p>
@@ -1579,38 +1566,37 @@
           <a:p>
             <a:pPr lvl="0"/>
             <a:r>
-              <a:rPr lang="de-DE" smtClean="0"/>
+              <a:rPr lang="de-DE"/>
               <a:t>Mastertextformat bearbeiten</a:t>
             </a:r>
           </a:p>
           <a:p>
             <a:pPr lvl="1"/>
             <a:r>
-              <a:rPr lang="de-DE" smtClean="0"/>
+              <a:rPr lang="de-DE"/>
               <a:t>Zweite Ebene</a:t>
             </a:r>
           </a:p>
           <a:p>
             <a:pPr lvl="2"/>
             <a:r>
-              <a:rPr lang="de-DE" smtClean="0"/>
+              <a:rPr lang="de-DE"/>
               <a:t>Dritte Ebene</a:t>
             </a:r>
           </a:p>
           <a:p>
             <a:pPr lvl="3"/>
             <a:r>
-              <a:rPr lang="de-DE" smtClean="0"/>
+              <a:rPr lang="de-DE"/>
               <a:t>Vierte Ebene</a:t>
             </a:r>
           </a:p>
           <a:p>
             <a:pPr lvl="4"/>
             <a:r>
-              <a:rPr lang="de-DE" smtClean="0"/>
+              <a:rPr lang="de-DE"/>
               <a:t>Fünfte Ebene</a:t>
             </a:r>
-            <a:endParaRPr lang="de-DE"/>
           </a:p>
         </p:txBody>
       </p:sp>
@@ -1673,7 +1659,7 @@
           <a:p>
             <a:pPr lvl="0"/>
             <a:r>
-              <a:rPr lang="de-DE" smtClean="0"/>
+              <a:rPr lang="de-DE"/>
               <a:t>Mastertextformat bearbeiten</a:t>
             </a:r>
           </a:p>
@@ -1729,38 +1715,37 @@
           <a:p>
             <a:pPr lvl="0"/>
             <a:r>
-              <a:rPr lang="de-DE" smtClean="0"/>
+              <a:rPr lang="de-DE"/>
               <a:t>Mastertextformat bearbeiten</a:t>
             </a:r>
           </a:p>
           <a:p>
             <a:pPr lvl="1"/>
             <a:r>
-              <a:rPr lang="de-DE" smtClean="0"/>
+              <a:rPr lang="de-DE"/>
               <a:t>Zweite Ebene</a:t>
             </a:r>
           </a:p>
           <a:p>
             <a:pPr lvl="2"/>
             <a:r>
-              <a:rPr lang="de-DE" smtClean="0"/>
+              <a:rPr lang="de-DE"/>
               <a:t>Dritte Ebene</a:t>
             </a:r>
           </a:p>
           <a:p>
             <a:pPr lvl="3"/>
             <a:r>
-              <a:rPr lang="de-DE" smtClean="0"/>
+              <a:rPr lang="de-DE"/>
               <a:t>Vierte Ebene</a:t>
             </a:r>
           </a:p>
           <a:p>
             <a:pPr lvl="4"/>
             <a:r>
-              <a:rPr lang="de-DE" smtClean="0"/>
+              <a:rPr lang="de-DE"/>
               <a:t>Fünfte Ebene</a:t>
             </a:r>
-            <a:endParaRPr lang="de-DE"/>
           </a:p>
         </p:txBody>
       </p:sp>
@@ -1781,7 +1766,7 @@
           <a:p>
             <a:fld id="{B4A60231-500B-C44A-9B19-425C835AF47F}" type="datetimeFigureOut">
               <a:rPr lang="de-DE" smtClean="0"/>
-              <a:t>22.02.16</a:t>
+              <a:t>23.07.23</a:t>
             </a:fld>
             <a:endParaRPr lang="de-DE"/>
           </a:p>
@@ -1875,10 +1860,9 @@
           <a:lstStyle/>
           <a:p>
             <a:r>
-              <a:rPr lang="de-DE" smtClean="0"/>
+              <a:rPr lang="de-DE"/>
               <a:t>Mastertitelformat bearbeiten</a:t>
             </a:r>
-            <a:endParaRPr lang="de-DE"/>
           </a:p>
         </p:txBody>
       </p:sp>
@@ -1899,7 +1883,7 @@
           <a:p>
             <a:fld id="{B4A60231-500B-C44A-9B19-425C835AF47F}" type="datetimeFigureOut">
               <a:rPr lang="de-DE" smtClean="0"/>
-              <a:t>22.02.16</a:t>
+              <a:t>23.07.23</a:t>
             </a:fld>
             <a:endParaRPr lang="de-DE"/>
           </a:p>
@@ -1994,7 +1978,7 @@
           <a:p>
             <a:fld id="{B4A60231-500B-C44A-9B19-425C835AF47F}" type="datetimeFigureOut">
               <a:rPr lang="de-DE" smtClean="0"/>
-              <a:t>22.02.16</a:t>
+              <a:t>23.07.23</a:t>
             </a:fld>
             <a:endParaRPr lang="de-DE"/>
           </a:p>
@@ -2097,10 +2081,9 @@
           </a:lstStyle>
           <a:p>
             <a:r>
-              <a:rPr lang="de-DE" smtClean="0"/>
+              <a:rPr lang="de-DE"/>
               <a:t>Mastertitelformat bearbeiten</a:t>
             </a:r>
-            <a:endParaRPr lang="de-DE"/>
           </a:p>
         </p:txBody>
       </p:sp>
@@ -2154,38 +2137,37 @@
           <a:p>
             <a:pPr lvl="0"/>
             <a:r>
-              <a:rPr lang="de-DE" smtClean="0"/>
+              <a:rPr lang="de-DE"/>
               <a:t>Mastertextformat bearbeiten</a:t>
             </a:r>
           </a:p>
           <a:p>
             <a:pPr lvl="1"/>
             <a:r>
-              <a:rPr lang="de-DE" smtClean="0"/>
+              <a:rPr lang="de-DE"/>
               <a:t>Zweite Ebene</a:t>
             </a:r>
           </a:p>
           <a:p>
             <a:pPr lvl="2"/>
             <a:r>
-              <a:rPr lang="de-DE" smtClean="0"/>
+              <a:rPr lang="de-DE"/>
               <a:t>Dritte Ebene</a:t>
             </a:r>
           </a:p>
           <a:p>
             <a:pPr lvl="3"/>
             <a:r>
-              <a:rPr lang="de-DE" smtClean="0"/>
+              <a:rPr lang="de-DE"/>
               <a:t>Vierte Ebene</a:t>
             </a:r>
           </a:p>
           <a:p>
             <a:pPr lvl="4"/>
             <a:r>
-              <a:rPr lang="de-DE" smtClean="0"/>
+              <a:rPr lang="de-DE"/>
               <a:t>Fünfte Ebene</a:t>
             </a:r>
-            <a:endParaRPr lang="de-DE"/>
           </a:p>
         </p:txBody>
       </p:sp>
@@ -2248,7 +2230,7 @@
           <a:p>
             <a:pPr lvl="0"/>
             <a:r>
-              <a:rPr lang="de-DE" smtClean="0"/>
+              <a:rPr lang="de-DE"/>
               <a:t>Mastertextformat bearbeiten</a:t>
             </a:r>
           </a:p>
@@ -2271,7 +2253,7 @@
           <a:p>
             <a:fld id="{B4A60231-500B-C44A-9B19-425C835AF47F}" type="datetimeFigureOut">
               <a:rPr lang="de-DE" smtClean="0"/>
-              <a:t>22.02.16</a:t>
+              <a:t>23.07.23</a:t>
             </a:fld>
             <a:endParaRPr lang="de-DE"/>
           </a:p>
@@ -2374,10 +2356,9 @@
           </a:lstStyle>
           <a:p>
             <a:r>
-              <a:rPr lang="de-DE" smtClean="0"/>
+              <a:rPr lang="de-DE"/>
               <a:t>Mastertitelformat bearbeiten</a:t>
             </a:r>
-            <a:endParaRPr lang="de-DE"/>
           </a:p>
         </p:txBody>
       </p:sp>
@@ -2501,7 +2482,7 @@
           <a:p>
             <a:pPr lvl="0"/>
             <a:r>
-              <a:rPr lang="de-DE" smtClean="0"/>
+              <a:rPr lang="de-DE"/>
               <a:t>Mastertextformat bearbeiten</a:t>
             </a:r>
           </a:p>
@@ -2524,7 +2505,7 @@
           <a:p>
             <a:fld id="{B4A60231-500B-C44A-9B19-425C835AF47F}" type="datetimeFigureOut">
               <a:rPr lang="de-DE" smtClean="0"/>
-              <a:t>22.02.16</a:t>
+              <a:t>23.07.23</a:t>
             </a:fld>
             <a:endParaRPr lang="de-DE"/>
           </a:p>
@@ -2633,10 +2614,9 @@
           <a:lstStyle/>
           <a:p>
             <a:r>
-              <a:rPr lang="de-DE" smtClean="0"/>
+              <a:rPr lang="de-DE"/>
               <a:t>Mastertitelformat bearbeiten</a:t>
             </a:r>
-            <a:endParaRPr lang="de-DE"/>
           </a:p>
         </p:txBody>
       </p:sp>
@@ -2667,38 +2647,37 @@
           <a:p>
             <a:pPr lvl="0"/>
             <a:r>
-              <a:rPr lang="de-DE" smtClean="0"/>
+              <a:rPr lang="de-DE"/>
               <a:t>Mastertextformat bearbeiten</a:t>
             </a:r>
           </a:p>
           <a:p>
             <a:pPr lvl="1"/>
             <a:r>
-              <a:rPr lang="de-DE" smtClean="0"/>
+              <a:rPr lang="de-DE"/>
               <a:t>Zweite Ebene</a:t>
             </a:r>
           </a:p>
           <a:p>
             <a:pPr lvl="2"/>
             <a:r>
-              <a:rPr lang="de-DE" smtClean="0"/>
+              <a:rPr lang="de-DE"/>
               <a:t>Dritte Ebene</a:t>
             </a:r>
           </a:p>
           <a:p>
             <a:pPr lvl="3"/>
             <a:r>
-              <a:rPr lang="de-DE" smtClean="0"/>
+              <a:rPr lang="de-DE"/>
               <a:t>Vierte Ebene</a:t>
             </a:r>
           </a:p>
           <a:p>
             <a:pPr lvl="4"/>
             <a:r>
-              <a:rPr lang="de-DE" smtClean="0"/>
+              <a:rPr lang="de-DE"/>
               <a:t>Fünfte Ebene</a:t>
             </a:r>
-            <a:endParaRPr lang="de-DE"/>
           </a:p>
         </p:txBody>
       </p:sp>
@@ -2737,7 +2716,7 @@
           <a:p>
             <a:fld id="{B4A60231-500B-C44A-9B19-425C835AF47F}" type="datetimeFigureOut">
               <a:rPr lang="de-DE" smtClean="0"/>
-              <a:t>22.02.16</a:t>
+              <a:t>23.07.23</a:t>
             </a:fld>
             <a:endParaRPr lang="de-DE"/>
           </a:p>
@@ -3232,7 +3211,7 @@
           <a:lstStyle/>
           <a:p>
             <a:r>
-              <a:rPr lang="de-DE" sz="1050" b="1" dirty="0" smtClean="0">
+              <a:rPr lang="de-DE" sz="1050" b="1" dirty="0">
                 <a:solidFill>
                   <a:schemeClr val="bg1"/>
                 </a:solidFill>
@@ -3242,7 +3221,7 @@
               <a:t>TRAININGSKARTE</a:t>
             </a:r>
             <a:r>
-              <a:rPr lang="de-DE" sz="1050" dirty="0" smtClean="0">
+              <a:rPr lang="de-DE" sz="1050" dirty="0">
                 <a:solidFill>
                   <a:schemeClr val="bg1"/>
                 </a:solidFill>
@@ -3252,7 +3231,7 @@
               <a:t> </a:t>
             </a:r>
             <a:r>
-              <a:rPr lang="de-DE" sz="1050" b="1" dirty="0" smtClean="0">
+              <a:rPr lang="de-DE" sz="1050" b="1" dirty="0">
                 <a:solidFill>
                   <a:schemeClr val="bg1"/>
                 </a:solidFill>
@@ -3261,13 +3240,6 @@
               </a:rPr>
               <a:t>SCR 06</a:t>
             </a:r>
-            <a:endParaRPr lang="de-DE" sz="1050" b="1" dirty="0">
-              <a:solidFill>
-                <a:schemeClr val="bg1"/>
-              </a:solidFill>
-              <a:latin typeface="Avenir Heavy"/>
-              <a:cs typeface="Avenir Heavy"/>
-            </a:endParaRPr>
           </a:p>
         </p:txBody>
       </p:sp>
@@ -3324,7 +3296,7 @@
           <a:lstStyle/>
           <a:p>
             <a:r>
-              <a:rPr lang="de-DE" sz="2400" dirty="0" smtClean="0">
+              <a:rPr lang="de-DE" sz="2400" dirty="0">
                 <a:solidFill>
                   <a:srgbClr val="7E006B"/>
                 </a:solidFill>
@@ -3334,7 +3306,7 @@
               <a:t>ZEIT </a:t>
             </a:r>
             <a:r>
-              <a:rPr lang="de-DE" sz="2300" dirty="0" smtClean="0">
+              <a:rPr lang="de-DE" sz="2300" dirty="0">
                 <a:solidFill>
                   <a:srgbClr val="7E006B"/>
                 </a:solidFill>
@@ -3343,13 +3315,6 @@
               </a:rPr>
               <a:t>ZUM WACHSEN</a:t>
             </a:r>
-            <a:endParaRPr lang="de-DE" sz="2300" dirty="0">
-              <a:solidFill>
-                <a:srgbClr val="7E006B"/>
-              </a:solidFill>
-              <a:latin typeface="Avenir Book"/>
-              <a:cs typeface="Avenir Book"/>
-            </a:endParaRPr>
           </a:p>
         </p:txBody>
       </p:sp>
@@ -3387,7 +3352,7 @@
               </a:buBlip>
             </a:pPr>
             <a:r>
-              <a:rPr lang="de-DE" sz="1000" dirty="0" smtClean="0">
+              <a:rPr lang="de-DE" sz="1000" dirty="0">
                 <a:solidFill>
                   <a:schemeClr val="bg1">
                     <a:lumMod val="50000"/>
@@ -3396,19 +3361,7 @@
                 <a:latin typeface="Avenir Book"/>
                 <a:cs typeface="Avenir Book"/>
               </a:rPr>
-              <a:t>Die </a:t>
-            </a:r>
-            <a:r>
-              <a:rPr lang="de-DE" sz="1000" dirty="0">
-                <a:solidFill>
-                  <a:schemeClr val="bg1">
-                    <a:lumMod val="50000"/>
-                  </a:schemeClr>
-                </a:solidFill>
-                <a:latin typeface="Avenir Book"/>
-                <a:cs typeface="Avenir Book"/>
-              </a:rPr>
-              <a:t>Sprint Retrospektive dient dem </a:t>
+              <a:t>Die Sprint Retrospektive dient dem </a:t>
             </a:r>
             <a:r>
               <a:rPr lang="de-DE" sz="1000" dirty="0" err="1">
@@ -3432,9 +3385,14 @@
                 <a:latin typeface="Avenir Book"/>
                 <a:cs typeface="Avenir Book"/>
               </a:rPr>
-              <a:t>-Team dazu, sich Zeit zur Reflektion zu nehmen um mögliche Verbesserungen für künftige Sprints zu entdecken. </a:t>
-            </a:r>
-            <a:endParaRPr lang="de-DE" sz="1000" dirty="0" smtClean="0">
+              <a:t>-Team dazu, sich Zeit zur Reflektion zu nehmen, um mögliche Verbesserungen für künftige Sprints zu entdecken. </a:t>
+            </a:r>
+          </a:p>
+          <a:p>
+            <a:pPr lvl="0">
+              <a:buSzPct val="170000"/>
+            </a:pPr>
+            <a:endParaRPr lang="de-DE" sz="1000" dirty="0">
               <a:solidFill>
                 <a:schemeClr val="bg1">
                   <a:lumMod val="50000"/>
@@ -3445,10 +3403,30 @@
             </a:endParaRPr>
           </a:p>
           <a:p>
+            <a:pPr marL="271463" lvl="0" indent="-271463">
+              <a:buSzPct val="170000"/>
+              <a:buBlip>
+                <a:blip r:embed="rId3"/>
+              </a:buBlip>
+            </a:pPr>
+            <a:r>
+              <a:rPr lang="de-DE" sz="1000" dirty="0">
+                <a:solidFill>
+                  <a:schemeClr val="bg1">
+                    <a:lumMod val="50000"/>
+                  </a:schemeClr>
+                </a:solidFill>
+                <a:latin typeface="Avenir Book"/>
+                <a:cs typeface="Avenir Book"/>
+              </a:rPr>
+              <a:t>Das Treffen ist auf drei Stunden für einmonatige Sprints beschränkt. Die Zeit verringert sich proportional zur Verkürzung des Sprints.</a:t>
+            </a:r>
+          </a:p>
+          <a:p>
             <a:pPr lvl="0">
               <a:buSzPct val="170000"/>
             </a:pPr>
-            <a:endParaRPr lang="de-DE" sz="1000" dirty="0" smtClean="0">
+            <a:endParaRPr lang="de-DE" sz="1000" dirty="0">
               <a:solidFill>
                 <a:schemeClr val="bg1">
                   <a:lumMod val="50000"/>
@@ -3466,7 +3444,7 @@
               </a:buBlip>
             </a:pPr>
             <a:r>
-              <a:rPr lang="de-DE" sz="1000" dirty="0" smtClean="0">
+              <a:rPr lang="de-DE" sz="1000" dirty="0">
                 <a:solidFill>
                   <a:schemeClr val="bg1">
                     <a:lumMod val="50000"/>
@@ -3475,38 +3453,14 @@
                 <a:latin typeface="Avenir Book"/>
                 <a:cs typeface="Avenir Book"/>
               </a:rPr>
-              <a:t>Das </a:t>
-            </a:r>
-            <a:r>
-              <a:rPr lang="de-DE" sz="1000" dirty="0">
-                <a:solidFill>
-                  <a:schemeClr val="bg1">
-                    <a:lumMod val="50000"/>
-                  </a:schemeClr>
-                </a:solidFill>
-                <a:latin typeface="Avenir Book"/>
-                <a:cs typeface="Avenir Book"/>
-              </a:rPr>
-              <a:t>Treffen ist auf drei Stunden für einmonatige Sprints beschränkt. Die Zeit verringert sich proportional zur Verkürzung des </a:t>
-            </a:r>
-            <a:r>
-              <a:rPr lang="de-DE" sz="1000" dirty="0" smtClean="0">
-                <a:solidFill>
-                  <a:schemeClr val="bg1">
-                    <a:lumMod val="50000"/>
-                  </a:schemeClr>
-                </a:solidFill>
-                <a:latin typeface="Avenir Book"/>
-                <a:cs typeface="Avenir Book"/>
-              </a:rPr>
-              <a:t>Sprints.</a:t>
+              <a:t>Selbstorganisation von Teams baut darauf, dass Menschen aus Erfahrung lernen. Wenn man ihnen Raum gibt sich anzupassen, finden selbstorganisierte Teams die besten Lösungen für ihre Probleme, denn sie sind es, die am tiefsten in der Materie stecken. </a:t>
             </a:r>
           </a:p>
           <a:p>
             <a:pPr lvl="0">
               <a:buSzPct val="170000"/>
             </a:pPr>
-            <a:endParaRPr lang="de-DE" sz="1000" dirty="0" smtClean="0">
+            <a:endParaRPr lang="de-DE" sz="1000" dirty="0">
               <a:solidFill>
                 <a:schemeClr val="bg1">
                   <a:lumMod val="50000"/>
@@ -3524,7 +3478,7 @@
               </a:buBlip>
             </a:pPr>
             <a:r>
-              <a:rPr lang="de-DE" sz="1000" dirty="0" smtClean="0">
+              <a:rPr lang="de-DE" sz="1000" dirty="0">
                 <a:solidFill>
                   <a:schemeClr val="bg1">
                     <a:lumMod val="50000"/>
@@ -3533,21 +3487,14 @@
                 <a:latin typeface="Avenir Book"/>
                 <a:cs typeface="Avenir Book"/>
               </a:rPr>
-              <a:t>Selbstorganisation </a:t>
-            </a:r>
-            <a:r>
-              <a:rPr lang="de-DE" sz="1000" dirty="0">
-                <a:solidFill>
-                  <a:schemeClr val="bg1">
-                    <a:lumMod val="50000"/>
-                  </a:schemeClr>
-                </a:solidFill>
-                <a:latin typeface="Avenir Book"/>
-                <a:cs typeface="Avenir Book"/>
-              </a:rPr>
-              <a:t>von Teams baut darauf, dass Menschen aus Erfahrung lernen. Wenn man ihnen Raum gibt sich anzupassen, finden selbstorganisierte Teams die besten Lösungen für ihre Probleme, denn sie sind es, die am tiefsten in der Materie stecken. </a:t>
-            </a:r>
-            <a:endParaRPr lang="de-DE" sz="1000" dirty="0" smtClean="0">
+              <a:t>Zeit einzuplanen, in der Du Dir immer wieder neu Rahmenbedingungen für gesundes Lernen schaffst, aus Deinen Fehlern lernst, wahrnimmst, was Deine größten Hindernisse und Lösungen dafür sind, steigert Deine Selbstwirksamkeit und gibt Dir als Mensch mehr Wert.  </a:t>
+            </a:r>
+          </a:p>
+          <a:p>
+            <a:pPr lvl="0">
+              <a:buSzPct val="170000"/>
+            </a:pPr>
+            <a:endParaRPr lang="de-DE" sz="1000" dirty="0">
               <a:solidFill>
                 <a:schemeClr val="bg1">
                   <a:lumMod val="50000"/>
@@ -3558,10 +3505,30 @@
             </a:endParaRPr>
           </a:p>
           <a:p>
+            <a:pPr marL="271463" lvl="0" indent="-271463">
+              <a:buSzPct val="170000"/>
+              <a:buBlip>
+                <a:blip r:embed="rId3"/>
+              </a:buBlip>
+            </a:pPr>
+            <a:r>
+              <a:rPr lang="de-DE" sz="1000" dirty="0">
+                <a:solidFill>
+                  <a:schemeClr val="bg1">
+                    <a:lumMod val="50000"/>
+                  </a:schemeClr>
+                </a:solidFill>
+                <a:latin typeface="Avenir Book"/>
+                <a:cs typeface="Avenir Book"/>
+              </a:rPr>
+              <a:t>Beim Üben sollte es nicht darum gehen Erwartungshaltungen zu erfüllen, am Ende brav abzuliefern, was von Außen gefordert wird, sondern darum satt zu werden von Musik und der eigenen Weiterentwicklung. Deine Wahrnehmung steht dabei im Mittelpunkt und bildet das Rückgrat für Dein persönliches Wachstum. </a:t>
+            </a:r>
+          </a:p>
+          <a:p>
             <a:pPr lvl="0">
               <a:buSzPct val="170000"/>
             </a:pPr>
-            <a:endParaRPr lang="de-DE" sz="1000" dirty="0" smtClean="0">
+            <a:endParaRPr lang="de-DE" sz="1000" dirty="0">
               <a:solidFill>
                 <a:schemeClr val="bg1">
                   <a:lumMod val="50000"/>
@@ -3579,7 +3546,7 @@
               </a:buBlip>
             </a:pPr>
             <a:r>
-              <a:rPr lang="de-DE" sz="1000" dirty="0" smtClean="0">
+              <a:rPr lang="de-DE" sz="1000" dirty="0">
                 <a:solidFill>
                   <a:schemeClr val="bg1">
                     <a:lumMod val="50000"/>
@@ -3588,129 +3555,7 @@
                 <a:latin typeface="Avenir Book"/>
                 <a:cs typeface="Avenir Book"/>
               </a:rPr>
-              <a:t>Zeit </a:t>
-            </a:r>
-            <a:r>
-              <a:rPr lang="de-DE" sz="1000" dirty="0">
-                <a:solidFill>
-                  <a:schemeClr val="bg1">
-                    <a:lumMod val="50000"/>
-                  </a:schemeClr>
-                </a:solidFill>
-                <a:latin typeface="Avenir Book"/>
-                <a:cs typeface="Avenir Book"/>
-              </a:rPr>
-              <a:t>einzuplanen, in der Du Dir immer wieder neu Rahmenbedingungen für gesundes Lernen schaffst, aus Deinen Fehlern lernst, wahrnimmst, was Deine größten Hindernisse und Lösungen dafür sind, steigert Deine Selbstwirksamkeit und gibt Dir als Mensch mehr Wert.  </a:t>
-            </a:r>
-            <a:endParaRPr lang="de-DE" sz="1000" dirty="0" smtClean="0">
-              <a:solidFill>
-                <a:schemeClr val="bg1">
-                  <a:lumMod val="50000"/>
-                </a:schemeClr>
-              </a:solidFill>
-              <a:latin typeface="Avenir Book"/>
-              <a:cs typeface="Avenir Book"/>
-            </a:endParaRPr>
-          </a:p>
-          <a:p>
-            <a:pPr lvl="0">
-              <a:buSzPct val="170000"/>
-            </a:pPr>
-            <a:endParaRPr lang="de-DE" sz="1000" dirty="0" smtClean="0">
-              <a:solidFill>
-                <a:schemeClr val="bg1">
-                  <a:lumMod val="50000"/>
-                </a:schemeClr>
-              </a:solidFill>
-              <a:latin typeface="Avenir Book"/>
-              <a:cs typeface="Avenir Book"/>
-            </a:endParaRPr>
-          </a:p>
-          <a:p>
-            <a:pPr marL="271463" lvl="0" indent="-271463">
-              <a:buSzPct val="170000"/>
-              <a:buBlip>
-                <a:blip r:embed="rId3"/>
-              </a:buBlip>
-            </a:pPr>
-            <a:r>
-              <a:rPr lang="de-DE" sz="1000" dirty="0" smtClean="0">
-                <a:solidFill>
-                  <a:schemeClr val="bg1">
-                    <a:lumMod val="50000"/>
-                  </a:schemeClr>
-                </a:solidFill>
-                <a:latin typeface="Avenir Book"/>
-                <a:cs typeface="Avenir Book"/>
-              </a:rPr>
-              <a:t>Beim </a:t>
-            </a:r>
-            <a:r>
-              <a:rPr lang="de-DE" sz="1000" dirty="0">
-                <a:solidFill>
-                  <a:schemeClr val="bg1">
-                    <a:lumMod val="50000"/>
-                  </a:schemeClr>
-                </a:solidFill>
-                <a:latin typeface="Avenir Book"/>
-                <a:cs typeface="Avenir Book"/>
-              </a:rPr>
-              <a:t>Üben sollte es nicht darum gehen Erwartungshaltungen zu erfüllen, am Ende brav abzuliefern, was von Außen gefordert wird, sondern darum satt zu werden von Musik und der eigenen Weiterentwicklung. Deine Wahrnehmung steht dabei im Mittelpunkt und bildet das Rückgrat für Dein persönliches Wachstum. </a:t>
-            </a:r>
-            <a:endParaRPr lang="de-DE" sz="1000" dirty="0" smtClean="0">
-              <a:solidFill>
-                <a:schemeClr val="bg1">
-                  <a:lumMod val="50000"/>
-                </a:schemeClr>
-              </a:solidFill>
-              <a:latin typeface="Avenir Book"/>
-              <a:cs typeface="Avenir Book"/>
-            </a:endParaRPr>
-          </a:p>
-          <a:p>
-            <a:pPr lvl="0">
-              <a:buSzPct val="170000"/>
-            </a:pPr>
-            <a:endParaRPr lang="de-DE" sz="1000" dirty="0" smtClean="0">
-              <a:solidFill>
-                <a:schemeClr val="bg1">
-                  <a:lumMod val="50000"/>
-                </a:schemeClr>
-              </a:solidFill>
-              <a:latin typeface="Avenir Book"/>
-              <a:cs typeface="Avenir Book"/>
-            </a:endParaRPr>
-          </a:p>
-          <a:p>
-            <a:pPr marL="271463" lvl="0" indent="-271463">
-              <a:buSzPct val="170000"/>
-              <a:buBlip>
-                <a:blip r:embed="rId3"/>
-              </a:buBlip>
-            </a:pPr>
-            <a:r>
-              <a:rPr lang="de-DE" sz="1000" dirty="0" smtClean="0">
-                <a:solidFill>
-                  <a:schemeClr val="bg1">
-                    <a:lumMod val="50000"/>
-                  </a:schemeClr>
-                </a:solidFill>
-                <a:latin typeface="Avenir Book"/>
-                <a:cs typeface="Avenir Book"/>
-              </a:rPr>
-              <a:t>Mit </a:t>
-            </a:r>
-            <a:r>
-              <a:rPr lang="de-DE" sz="1000" dirty="0">
-                <a:solidFill>
-                  <a:schemeClr val="bg1">
-                    <a:lumMod val="50000"/>
-                  </a:schemeClr>
-                </a:solidFill>
-                <a:latin typeface="Avenir Book"/>
-                <a:cs typeface="Avenir Book"/>
-              </a:rPr>
-              <a:t>jeder Retrofrage, die Du Dir stellst und ehrlich beantwortest, stärkst Du Deine Wahrnehmung und übernimmst die Verantwortung für Dein Wachsen.</a:t>
+              <a:t>Mit jeder Retrofrage, die Du Dir stellst und ehrlich beantwortest, stärkst Du Deine Wahrnehmung und übernimmst die Verantwortung für Deinen Fortschritt.</a:t>
             </a:r>
           </a:p>
         </p:txBody>
@@ -3910,7 +3755,7 @@
           <a:lstStyle/>
           <a:p>
             <a:r>
-              <a:rPr lang="de-DE" sz="1050" b="1" dirty="0" smtClean="0">
+              <a:rPr lang="de-DE" sz="1050" b="1" dirty="0">
                 <a:solidFill>
                   <a:schemeClr val="bg1"/>
                 </a:solidFill>
@@ -3920,7 +3765,7 @@
               <a:t>TRAININGSKARTE</a:t>
             </a:r>
             <a:r>
-              <a:rPr lang="de-DE" sz="1050" dirty="0" smtClean="0">
+              <a:rPr lang="de-DE" sz="1050" dirty="0">
                 <a:solidFill>
                   <a:schemeClr val="bg1"/>
                 </a:solidFill>
@@ -3930,7 +3775,7 @@
               <a:t> </a:t>
             </a:r>
             <a:r>
-              <a:rPr lang="de-DE" sz="1050" b="1" dirty="0" smtClean="0">
+              <a:rPr lang="de-DE" sz="1050" b="1" dirty="0">
                 <a:solidFill>
                   <a:schemeClr val="bg1"/>
                 </a:solidFill>
@@ -3939,13 +3784,6 @@
               </a:rPr>
               <a:t>SCR 06</a:t>
             </a:r>
-            <a:endParaRPr lang="de-DE" sz="1050" b="1" dirty="0">
-              <a:solidFill>
-                <a:schemeClr val="bg1"/>
-              </a:solidFill>
-              <a:latin typeface="Avenir Heavy"/>
-              <a:cs typeface="Avenir Heavy"/>
-            </a:endParaRPr>
           </a:p>
         </p:txBody>
       </p:sp>
@@ -4002,7 +3840,7 @@
           <a:lstStyle/>
           <a:p>
             <a:r>
-              <a:rPr lang="de-DE" sz="2400" dirty="0" smtClean="0">
+              <a:rPr lang="de-DE" sz="2400" dirty="0">
                 <a:solidFill>
                   <a:srgbClr val="7E006B"/>
                 </a:solidFill>
@@ -4012,7 +3850,7 @@
               <a:t>TR	AININGS</a:t>
             </a:r>
             <a:r>
-              <a:rPr lang="de-DE" sz="2400" dirty="0" smtClean="0">
+              <a:rPr lang="de-DE" sz="2400" dirty="0">
                 <a:solidFill>
                   <a:srgbClr val="7E006B"/>
                 </a:solidFill>
@@ -4065,61 +3903,21 @@
               </a:buBlip>
             </a:pPr>
             <a:r>
-              <a:rPr lang="de-DE" sz="1000" dirty="0" smtClean="0">
+              <a:rPr lang="de-DE" sz="1000" dirty="0">
                 <a:solidFill>
                   <a:srgbClr val="7F7F7F"/>
                 </a:solidFill>
                 <a:latin typeface="Avenir Book"/>
                 <a:cs typeface="Avenir Book"/>
               </a:rPr>
-              <a:t>Setze </a:t>
-            </a:r>
-            <a:r>
-              <a:rPr lang="de-DE" sz="1000" dirty="0">
-                <a:solidFill>
-                  <a:srgbClr val="7F7F7F"/>
-                </a:solidFill>
-                <a:latin typeface="Avenir Book"/>
-                <a:cs typeface="Avenir Book"/>
-              </a:rPr>
-              <a:t>Dich nach einem Sprint mit Deinem Team für eine Retro zusammen. Wiederhole das </a:t>
-            </a:r>
-            <a:r>
-              <a:rPr lang="de-DE" sz="1000" dirty="0" smtClean="0">
-                <a:solidFill>
-                  <a:srgbClr val="7F7F7F"/>
-                </a:solidFill>
-                <a:latin typeface="Avenir Book"/>
-                <a:cs typeface="Avenir Book"/>
-              </a:rPr>
-              <a:t>zwei </a:t>
-            </a:r>
-            <a:r>
-              <a:rPr lang="de-DE" sz="1000" dirty="0">
-                <a:solidFill>
-                  <a:srgbClr val="7F7F7F"/>
-                </a:solidFill>
-                <a:latin typeface="Avenir Book"/>
-                <a:cs typeface="Avenir Book"/>
-              </a:rPr>
-              <a:t>Mal </a:t>
-            </a:r>
-            <a:r>
-              <a:rPr lang="de-DE" sz="1000" dirty="0" smtClean="0">
-                <a:solidFill>
-                  <a:srgbClr val="7F7F7F"/>
-                </a:solidFill>
-                <a:latin typeface="Avenir Book"/>
-                <a:cs typeface="Avenir Book"/>
-              </a:rPr>
-              <a:t>jeweils verbunden mit einem Sprintende.</a:t>
+              <a:t>Setze Dich nach einem Sprint mit Deinem Team für eine Retro zusammen. Wiederhole das zwei Mal jeweils verbunden mit einem Sprintende.</a:t>
             </a:r>
           </a:p>
           <a:p>
             <a:pPr>
               <a:buSzPct val="170000"/>
             </a:pPr>
-            <a:endParaRPr lang="de-DE" sz="1000" dirty="0" smtClean="0">
+            <a:endParaRPr lang="de-DE" sz="1000" dirty="0">
               <a:solidFill>
                 <a:srgbClr val="7F7F7F"/>
               </a:solidFill>
@@ -4135,41 +3933,21 @@
               </a:buBlip>
             </a:pPr>
             <a:r>
-              <a:rPr lang="de-DE" sz="1000" dirty="0" smtClean="0">
+              <a:rPr lang="de-DE" sz="1000" dirty="0">
                 <a:solidFill>
                   <a:srgbClr val="7F7F7F"/>
                 </a:solidFill>
                 <a:latin typeface="Avenir Book"/>
                 <a:cs typeface="Avenir Book"/>
               </a:rPr>
-              <a:t>Diskutiert </a:t>
-            </a:r>
-            <a:r>
-              <a:rPr lang="de-DE" sz="1000" dirty="0">
-                <a:solidFill>
-                  <a:srgbClr val="7F7F7F"/>
-                </a:solidFill>
-                <a:latin typeface="Avenir Book"/>
-                <a:cs typeface="Avenir Book"/>
-              </a:rPr>
-              <a:t>über Hindernisse und findet in der Retrospektive gemeinsam mindestens 3 messbare Verbesserungen, die ihr in der kommenden Iteration umsetzen wollt. Reflektiert diese spätestens in der nächsten Retrospektive und passt sie ggf. </a:t>
-            </a:r>
-            <a:r>
-              <a:rPr lang="de-DE" sz="1000" dirty="0" smtClean="0">
-                <a:solidFill>
-                  <a:srgbClr val="7F7F7F"/>
-                </a:solidFill>
-                <a:latin typeface="Avenir Book"/>
-                <a:cs typeface="Avenir Book"/>
-              </a:rPr>
-              <a:t>an.</a:t>
+              <a:t>Diskutiert über Hindernisse und findet in der Retrospektive gemeinsam mindestens 3 messbare Verbesserungen, die Ihr in der kommenden Iteration umsetzen wollt. Reflektiert diese spätestens in der nächsten Retrospektive und passt sie ggf. an.</a:t>
             </a:r>
           </a:p>
           <a:p>
             <a:pPr>
               <a:buSzPct val="170000"/>
             </a:pPr>
-            <a:endParaRPr lang="de-DE" sz="1000" dirty="0" smtClean="0">
+            <a:endParaRPr lang="de-DE" sz="1000" dirty="0">
               <a:solidFill>
                 <a:srgbClr val="7F7F7F"/>
               </a:solidFill>
@@ -4185,7 +3963,7 @@
               </a:buBlip>
             </a:pPr>
             <a:r>
-              <a:rPr lang="de-DE" sz="1000" dirty="0" smtClean="0">
+              <a:rPr lang="de-DE" sz="1000" dirty="0">
                 <a:solidFill>
                   <a:srgbClr val="7F7F7F"/>
                 </a:solidFill>
@@ -4212,37 +3990,17 @@
                 <a:latin typeface="Avenir Book"/>
                 <a:cs typeface="Avenir Book"/>
               </a:rPr>
-              <a:t> findest du viele Wahrnehmungsfragen </a:t>
-            </a:r>
-            <a:r>
-              <a:rPr lang="de-DE" sz="1000" dirty="0" smtClean="0">
-                <a:solidFill>
-                  <a:srgbClr val="7F7F7F"/>
+              <a:t> findest Du viele Wahrnehmungsfragen (</a:t>
+            </a:r>
+            <a:r>
+              <a:rPr lang="de-DE" sz="1000" u="sng" dirty="0" err="1">
+                <a:solidFill>
+                  <a:srgbClr val="820667"/>
                 </a:solidFill>
                 <a:latin typeface="Avenir Book"/>
                 <a:cs typeface="Avenir Book"/>
               </a:rPr>
-              <a:t>(</a:t>
-            </a:r>
-            <a:r>
-              <a:rPr lang="de-DE" sz="1000" u="sng" dirty="0" err="1" smtClean="0">
-                <a:solidFill>
-                  <a:srgbClr val="820667"/>
-                </a:solidFill>
-                <a:latin typeface="Avenir Book"/>
-                <a:cs typeface="Avenir Book"/>
-              </a:rPr>
-              <a:t>www.plans</a:t>
-            </a:r>
-            <a:r>
-              <a:rPr lang="de-DE" sz="1000" u="sng" dirty="0" err="1">
-                <a:solidFill>
-                  <a:srgbClr val="820667"/>
-                </a:solidFill>
-                <a:latin typeface="Avenir Book"/>
-                <a:cs typeface="Avenir Book"/>
-              </a:rPr>
-              <a:t>-for-retrospectives.com</a:t>
+              <a:t>www.plans-for-retrospectives.com</a:t>
             </a:r>
             <a:r>
               <a:rPr lang="de-DE" sz="1000" dirty="0">
@@ -4254,7 +4012,82 @@
               </a:rPr>
               <a:t>), die Dir bei Deiner Reflektion helfen. </a:t>
             </a:r>
-            <a:endParaRPr lang="de-DE" sz="1000" dirty="0" smtClean="0">
+          </a:p>
+          <a:p>
+            <a:pPr>
+              <a:buSzPct val="170000"/>
+            </a:pPr>
+            <a:endParaRPr lang="de-DE" sz="1000" dirty="0">
+              <a:solidFill>
+                <a:srgbClr val="820667"/>
+              </a:solidFill>
+              <a:latin typeface="Avenir Book"/>
+              <a:cs typeface="Avenir Book"/>
+            </a:endParaRPr>
+          </a:p>
+          <a:p>
+            <a:pPr marL="271463" indent="-271463">
+              <a:buSzPct val="170000"/>
+              <a:buBlip>
+                <a:blip r:embed="rId3"/>
+              </a:buBlip>
+            </a:pPr>
+            <a:r>
+              <a:rPr lang="de-DE" sz="1000" dirty="0">
+                <a:solidFill>
+                  <a:srgbClr val="7F7F7F"/>
+                </a:solidFill>
+                <a:latin typeface="Avenir Book"/>
+                <a:cs typeface="Avenir Book"/>
+              </a:rPr>
+              <a:t>Innerhalb eines musikalischen Teams könnt Ihr während der Retro Eure Definition </a:t>
+            </a:r>
+            <a:r>
+              <a:rPr lang="de-DE" sz="1000" dirty="0" err="1">
+                <a:solidFill>
+                  <a:srgbClr val="7F7F7F"/>
+                </a:solidFill>
+                <a:latin typeface="Avenir Book"/>
+                <a:cs typeface="Avenir Book"/>
+              </a:rPr>
+              <a:t>of</a:t>
+            </a:r>
+            <a:r>
+              <a:rPr lang="de-DE" sz="1000" dirty="0">
+                <a:solidFill>
+                  <a:srgbClr val="7F7F7F"/>
+                </a:solidFill>
+                <a:latin typeface="Avenir Book"/>
+                <a:cs typeface="Avenir Book"/>
+              </a:rPr>
+              <a:t> </a:t>
+            </a:r>
+            <a:r>
+              <a:rPr lang="de-DE" sz="1000" dirty="0" err="1">
+                <a:solidFill>
+                  <a:srgbClr val="7F7F7F"/>
+                </a:solidFill>
+                <a:latin typeface="Avenir Book"/>
+                <a:cs typeface="Avenir Book"/>
+              </a:rPr>
+              <a:t>Done</a:t>
+            </a:r>
+            <a:r>
+              <a:rPr lang="de-DE" sz="1000" dirty="0">
+                <a:solidFill>
+                  <a:srgbClr val="7F7F7F"/>
+                </a:solidFill>
+                <a:latin typeface="Avenir Book"/>
+                <a:cs typeface="Avenir Book"/>
+              </a:rPr>
+              <a:t> entsprechend euren gewonnenen Erkenntnissen anpassen.</a:t>
+            </a:r>
+          </a:p>
+          <a:p>
+            <a:pPr>
+              <a:buSzPct val="170000"/>
+            </a:pPr>
+            <a:endParaRPr lang="de-DE" sz="1000" dirty="0">
               <a:solidFill>
                 <a:srgbClr val="7F7F7F"/>
               </a:solidFill>
@@ -4263,18 +4096,6 @@
             </a:endParaRPr>
           </a:p>
           <a:p>
-            <a:pPr>
-              <a:buSzPct val="170000"/>
-            </a:pPr>
-            <a:endParaRPr lang="de-DE" sz="1000" dirty="0" smtClean="0">
-              <a:solidFill>
-                <a:srgbClr val="820667"/>
-              </a:solidFill>
-              <a:latin typeface="Avenir Book"/>
-              <a:cs typeface="Avenir Book"/>
-            </a:endParaRPr>
-          </a:p>
-          <a:p>
             <a:pPr marL="271463" indent="-271463">
               <a:buSzPct val="170000"/>
               <a:buBlip>
@@ -4282,114 +4103,34 @@
               </a:buBlip>
             </a:pPr>
             <a:r>
-              <a:rPr lang="de-DE" sz="1000" dirty="0" smtClean="0">
+              <a:rPr lang="de-DE" sz="1000" dirty="0">
                 <a:solidFill>
                   <a:srgbClr val="7F7F7F"/>
                 </a:solidFill>
                 <a:latin typeface="Avenir Book"/>
                 <a:cs typeface="Avenir Book"/>
               </a:rPr>
-              <a:t>Innerhalb </a:t>
-            </a:r>
-            <a:r>
-              <a:rPr lang="de-DE" sz="1000" dirty="0">
+              <a:t>Wenn Du nur für Dich selbst übst, ist eine Retro mit anderen Kollegen, die ohne Team üben, sehr hilfreich um Zeugen zu haben, wie Du Dein Training anpassen willst. Das fordert von Dir, Deine eigenen Vorsätze ernster zu nehmen, weil Du weißt, dass Du Dir und </a:t>
+            </a:r>
+            <a:r>
+              <a:rPr lang="de-DE" sz="1000">
                 <a:solidFill>
                   <a:srgbClr val="7F7F7F"/>
                 </a:solidFill>
                 <a:latin typeface="Avenir Book"/>
                 <a:cs typeface="Avenir Book"/>
               </a:rPr>
-              <a:t>eines musikalischen Teams könnt ihr während der Retro eure Definition </a:t>
-            </a:r>
-            <a:r>
-              <a:rPr lang="de-DE" sz="1000" dirty="0" err="1">
+              <a:t>Ihnen gegenüber von </a:t>
+            </a:r>
+            <a:r>
+              <a:rPr lang="de-DE" sz="1000" dirty="0">
                 <a:solidFill>
                   <a:srgbClr val="7F7F7F"/>
                 </a:solidFill>
                 <a:latin typeface="Avenir Book"/>
                 <a:cs typeface="Avenir Book"/>
               </a:rPr>
-              <a:t>of</a:t>
-            </a:r>
-            <a:r>
-              <a:rPr lang="de-DE" sz="1000" dirty="0">
-                <a:solidFill>
-                  <a:srgbClr val="7F7F7F"/>
-                </a:solidFill>
-                <a:latin typeface="Avenir Book"/>
-                <a:cs typeface="Avenir Book"/>
-              </a:rPr>
-              <a:t> </a:t>
-            </a:r>
-            <a:r>
-              <a:rPr lang="de-DE" sz="1000" dirty="0" err="1">
-                <a:solidFill>
-                  <a:srgbClr val="7F7F7F"/>
-                </a:solidFill>
-                <a:latin typeface="Avenir Book"/>
-                <a:cs typeface="Avenir Book"/>
-              </a:rPr>
-              <a:t>Done</a:t>
-            </a:r>
-            <a:r>
-              <a:rPr lang="de-DE" sz="1000" dirty="0">
-                <a:solidFill>
-                  <a:srgbClr val="7F7F7F"/>
-                </a:solidFill>
-                <a:latin typeface="Avenir Book"/>
-                <a:cs typeface="Avenir Book"/>
-              </a:rPr>
-              <a:t> entsprechend euren gewonnenen Erkenntnissen </a:t>
-            </a:r>
-            <a:r>
-              <a:rPr lang="de-DE" sz="1000" dirty="0" smtClean="0">
-                <a:solidFill>
-                  <a:srgbClr val="7F7F7F"/>
-                </a:solidFill>
-                <a:latin typeface="Avenir Book"/>
-                <a:cs typeface="Avenir Book"/>
-              </a:rPr>
-              <a:t>anpassen.</a:t>
-            </a:r>
-          </a:p>
-          <a:p>
-            <a:pPr>
-              <a:buSzPct val="170000"/>
-            </a:pPr>
-            <a:endParaRPr lang="de-DE" sz="1000" dirty="0" smtClean="0">
-              <a:solidFill>
-                <a:srgbClr val="7F7F7F"/>
-              </a:solidFill>
-              <a:latin typeface="Avenir Book"/>
-              <a:cs typeface="Avenir Book"/>
-            </a:endParaRPr>
-          </a:p>
-          <a:p>
-            <a:pPr marL="271463" indent="-271463">
-              <a:buSzPct val="170000"/>
-              <a:buBlip>
-                <a:blip r:embed="rId3"/>
-              </a:buBlip>
-            </a:pPr>
-            <a:r>
-              <a:rPr lang="de-DE" sz="1000" dirty="0" smtClean="0">
-                <a:solidFill>
-                  <a:srgbClr val="7F7F7F"/>
-                </a:solidFill>
-                <a:latin typeface="Avenir Book"/>
-                <a:cs typeface="Avenir Book"/>
-              </a:rPr>
-              <a:t>Wenn </a:t>
-            </a:r>
-            <a:r>
-              <a:rPr lang="de-DE" sz="1000" dirty="0">
-                <a:solidFill>
-                  <a:srgbClr val="7F7F7F"/>
-                </a:solidFill>
-                <a:latin typeface="Avenir Book"/>
-                <a:cs typeface="Avenir Book"/>
-              </a:rPr>
-              <a:t>Du nur für Dich selbst übst, ist eine Retro mit anderen Kollegen, die ohne Team üben, sehr hilfreich um Zeugen zu haben, wie Du Dein Training anpassen willst. Das hilft Dir, Deine eigenen Vorsätze ernster zu nehmen, weil Du weißt, dass Du Dir und ihnen von Zeit zu Zeit Rechenschaft schuldest.</a:t>
+              <a:t>Zeit zu Zeit Rechenschaft ablegst.</a:t>
             </a:r>
           </a:p>
         </p:txBody>
@@ -4441,14 +4182,20 @@
       </p:sp>
       <p:sp>
         <p:nvSpPr>
-          <p:cNvPr id="11" name="Shape 7"/>
+          <p:cNvPr id="2" name="Shape 7">
+            <a:extLst>
+              <a:ext uri="{FF2B5EF4-FFF2-40B4-BE49-F238E27FC236}">
+                <a16:creationId xmlns:a16="http://schemas.microsoft.com/office/drawing/2014/main" id="{9CB4538D-491C-CFAB-C953-43BAB7848164}"/>
+              </a:ext>
+            </a:extLst>
+          </p:cNvPr>
           <p:cNvSpPr/>
           <p:nvPr/>
         </p:nvSpPr>
         <p:spPr>
           <a:xfrm>
-            <a:off x="1683417" y="4952581"/>
-            <a:ext cx="4196016" cy="276995"/>
+            <a:off x="971550" y="4689585"/>
+            <a:ext cx="4691860" cy="461661"/>
           </a:xfrm>
           <a:prstGeom prst="rect">
             <a:avLst/>
@@ -4458,12 +4205,12 @@
           </a:ln>
           <a:extLst>
             <a:ext uri="{C572A759-6A51-4108-AA02-DFA0A04FC94B}">
-              <ma14:wrappingTextBoxFlag xmlns:ma14="http://schemas.microsoft.com/office/mac/drawingml/2011/main" val="1"/>
+              <ma14:wrappingTextBoxFlag xmlns="" xmlns:ma14="http://schemas.microsoft.com/office/mac/drawingml/2011/main" val="1"/>
             </a:ext>
           </a:extLst>
         </p:spPr>
         <p:txBody>
-          <a:bodyPr wrap="none" lIns="45718" tIns="45718" rIns="45718" bIns="45718">
+          <a:bodyPr wrap="square" lIns="45718" tIns="45718" rIns="45718" bIns="45718">
             <a:spAutoFit/>
           </a:bodyPr>
           <a:lstStyle/>
@@ -4472,49 +4219,266 @@
               <a:defRPr sz="1800"/>
             </a:pPr>
             <a:r>
-              <a:rPr sz="600" dirty="0">
-                <a:latin typeface="Avenir Light"/>
+              <a:rPr lang="de-DE" sz="800" b="0" i="0" u="none" strike="noStrike" dirty="0" err="1">
+                <a:solidFill>
+                  <a:schemeClr val="tx1">
+                    <a:lumMod val="65000"/>
+                    <a:lumOff val="35000"/>
+                  </a:schemeClr>
+                </a:solidFill>
+                <a:effectLst/>
+                <a:latin typeface="Avenir Book" panose="02000503020000020003" pitchFamily="2" charset="0"/>
+              </a:rPr>
+              <a:t>music</a:t>
+            </a:r>
+            <a:r>
+              <a:rPr lang="de-DE" sz="800" b="0" i="0" u="none" strike="noStrike" dirty="0">
+                <a:solidFill>
+                  <a:schemeClr val="tx1">
+                    <a:lumMod val="65000"/>
+                    <a:lumOff val="35000"/>
+                  </a:schemeClr>
+                </a:solidFill>
+                <a:effectLst/>
+                <a:latin typeface="Avenir Book" panose="02000503020000020003" pitchFamily="2" charset="0"/>
+              </a:rPr>
+              <a:t> </a:t>
+            </a:r>
+            <a:r>
+              <a:rPr lang="de-DE" sz="800" b="0" i="0" u="none" strike="noStrike" dirty="0" err="1">
+                <a:solidFill>
+                  <a:schemeClr val="tx1">
+                    <a:lumMod val="65000"/>
+                    <a:lumOff val="35000"/>
+                  </a:schemeClr>
+                </a:solidFill>
+                <a:effectLst/>
+                <a:latin typeface="Avenir Book" panose="02000503020000020003" pitchFamily="2" charset="0"/>
+              </a:rPr>
+              <a:t>moves</a:t>
+            </a:r>
+            <a:r>
+              <a:rPr lang="de-DE" sz="800" b="0" i="0" u="none" strike="noStrike" dirty="0">
+                <a:solidFill>
+                  <a:schemeClr val="tx1">
+                    <a:lumMod val="65000"/>
+                    <a:lumOff val="35000"/>
+                  </a:schemeClr>
+                </a:solidFill>
+                <a:effectLst/>
+                <a:latin typeface="Avenir Book" panose="02000503020000020003" pitchFamily="2" charset="0"/>
+              </a:rPr>
+              <a:t>-Trainingskarten von Regina Brandhuber sind lizenziert unter einer Creative Commons </a:t>
+            </a:r>
+          </a:p>
+          <a:p>
+            <a:pPr lvl="0" algn="ctr">
+              <a:defRPr sz="1800"/>
+            </a:pPr>
+            <a:r>
+              <a:rPr lang="de-DE" sz="800" b="0" i="0" u="none" strike="noStrike" dirty="0">
+                <a:solidFill>
+                  <a:schemeClr val="tx1">
+                    <a:lumMod val="65000"/>
+                    <a:lumOff val="35000"/>
+                  </a:schemeClr>
+                </a:solidFill>
+                <a:effectLst/>
+                <a:latin typeface="Avenir Book" panose="02000503020000020003" pitchFamily="2" charset="0"/>
+              </a:rPr>
+              <a:t>Namensnennung-Nicht kommerziell 4.0 International Lizenz.</a:t>
+            </a:r>
+          </a:p>
+          <a:p>
+            <a:pPr lvl="0" algn="ctr">
+              <a:defRPr sz="1800"/>
+            </a:pPr>
+            <a:r>
+              <a:rPr lang="de-DE" sz="800" dirty="0">
+                <a:solidFill>
+                  <a:schemeClr val="tx1">
+                    <a:lumMod val="65000"/>
+                    <a:lumOff val="35000"/>
+                  </a:schemeClr>
+                </a:solidFill>
+                <a:latin typeface="Avenir Book" panose="02000503020000020003" pitchFamily="2" charset="0"/>
                 <a:ea typeface="Calibri"/>
                 <a:cs typeface="Avenir Light"/>
                 <a:sym typeface="Calibri"/>
               </a:rPr>
-              <a:t>This work is licensed under the Creative Commons Attribution-NonCommercial-NoDerivatives 4.0 International License. </a:t>
-            </a:r>
-          </a:p>
-          <a:p>
-            <a:pPr lvl="0" algn="ctr">
-              <a:defRPr sz="1800"/>
-            </a:pPr>
-            <a:r>
-              <a:rPr sz="600" dirty="0">
-                <a:latin typeface="Avenir Light"/>
+              <a:t>Nachzulesen unter:</a:t>
+            </a:r>
+            <a:r>
+              <a:rPr sz="800" dirty="0">
+                <a:solidFill>
+                  <a:schemeClr val="tx1">
+                    <a:lumMod val="65000"/>
+                    <a:lumOff val="35000"/>
+                  </a:schemeClr>
+                </a:solidFill>
+                <a:latin typeface="Avenir Book" panose="02000503020000020003" pitchFamily="2" charset="0"/>
                 <a:ea typeface="Calibri"/>
                 <a:cs typeface="Avenir Light"/>
                 <a:sym typeface="Calibri"/>
               </a:rPr>
-              <a:t>To view a copy of this license, visit http://creativecommons.org/licenses/by-nc-nd/4.0/.</a:t>
-            </a:r>
+              <a:t> </a:t>
+            </a:r>
+            <a:r>
+              <a:rPr lang="de-DE" sz="800" dirty="0">
+                <a:solidFill>
+                  <a:schemeClr val="tx1">
+                    <a:lumMod val="65000"/>
+                    <a:lumOff val="35000"/>
+                  </a:schemeClr>
+                </a:solidFill>
+                <a:latin typeface="Avenir Book" panose="02000503020000020003" pitchFamily="2" charset="0"/>
+                <a:ea typeface="Calibri"/>
+                <a:cs typeface="Avenir Light"/>
+                <a:sym typeface="Calibri"/>
+              </a:rPr>
+              <a:t>https://</a:t>
+            </a:r>
+            <a:r>
+              <a:rPr lang="de-DE" sz="800" dirty="0" err="1">
+                <a:solidFill>
+                  <a:schemeClr val="tx1">
+                    <a:lumMod val="65000"/>
+                    <a:lumOff val="35000"/>
+                  </a:schemeClr>
+                </a:solidFill>
+                <a:latin typeface="Avenir Book" panose="02000503020000020003" pitchFamily="2" charset="0"/>
+                <a:ea typeface="Calibri"/>
+                <a:cs typeface="Avenir Light"/>
+                <a:sym typeface="Calibri"/>
+              </a:rPr>
+              <a:t>creativecommons.org</a:t>
+            </a:r>
+            <a:r>
+              <a:rPr lang="de-DE" sz="800" dirty="0">
+                <a:solidFill>
+                  <a:schemeClr val="tx1">
+                    <a:lumMod val="65000"/>
+                    <a:lumOff val="35000"/>
+                  </a:schemeClr>
+                </a:solidFill>
+                <a:latin typeface="Avenir Book" panose="02000503020000020003" pitchFamily="2" charset="0"/>
+                <a:ea typeface="Calibri"/>
+                <a:cs typeface="Avenir Light"/>
+                <a:sym typeface="Calibri"/>
+              </a:rPr>
+              <a:t>/</a:t>
+            </a:r>
+            <a:r>
+              <a:rPr lang="de-DE" sz="800" dirty="0" err="1">
+                <a:solidFill>
+                  <a:schemeClr val="tx1">
+                    <a:lumMod val="65000"/>
+                    <a:lumOff val="35000"/>
+                  </a:schemeClr>
+                </a:solidFill>
+                <a:latin typeface="Avenir Book" panose="02000503020000020003" pitchFamily="2" charset="0"/>
+                <a:ea typeface="Calibri"/>
+                <a:cs typeface="Avenir Light"/>
+                <a:sym typeface="Calibri"/>
+              </a:rPr>
+              <a:t>licenses</a:t>
+            </a:r>
+            <a:r>
+              <a:rPr lang="de-DE" sz="800" dirty="0">
+                <a:solidFill>
+                  <a:schemeClr val="tx1">
+                    <a:lumMod val="65000"/>
+                    <a:lumOff val="35000"/>
+                  </a:schemeClr>
+                </a:solidFill>
+                <a:latin typeface="Avenir Book" panose="02000503020000020003" pitchFamily="2" charset="0"/>
+                <a:ea typeface="Calibri"/>
+                <a:cs typeface="Avenir Light"/>
+                <a:sym typeface="Calibri"/>
+              </a:rPr>
+              <a:t>/</a:t>
+            </a:r>
+            <a:r>
+              <a:rPr lang="de-DE" sz="800" dirty="0" err="1">
+                <a:solidFill>
+                  <a:schemeClr val="tx1">
+                    <a:lumMod val="65000"/>
+                    <a:lumOff val="35000"/>
+                  </a:schemeClr>
+                </a:solidFill>
+                <a:latin typeface="Avenir Book" panose="02000503020000020003" pitchFamily="2" charset="0"/>
+                <a:ea typeface="Calibri"/>
+                <a:cs typeface="Avenir Light"/>
+                <a:sym typeface="Calibri"/>
+              </a:rPr>
+              <a:t>by-nc</a:t>
+            </a:r>
+            <a:r>
+              <a:rPr lang="de-DE" sz="800" dirty="0">
+                <a:solidFill>
+                  <a:schemeClr val="tx1">
+                    <a:lumMod val="65000"/>
+                    <a:lumOff val="35000"/>
+                  </a:schemeClr>
+                </a:solidFill>
+                <a:latin typeface="Avenir Book" panose="02000503020000020003" pitchFamily="2" charset="0"/>
+                <a:ea typeface="Calibri"/>
+                <a:cs typeface="Avenir Light"/>
+                <a:sym typeface="Calibri"/>
+              </a:rPr>
+              <a:t>/4.0/</a:t>
+            </a:r>
+            <a:r>
+              <a:rPr lang="de-DE" sz="800" dirty="0" err="1">
+                <a:solidFill>
+                  <a:schemeClr val="tx1">
+                    <a:lumMod val="65000"/>
+                    <a:lumOff val="35000"/>
+                  </a:schemeClr>
+                </a:solidFill>
+                <a:latin typeface="Avenir Book" panose="02000503020000020003" pitchFamily="2" charset="0"/>
+                <a:ea typeface="Calibri"/>
+                <a:cs typeface="Avenir Light"/>
+                <a:sym typeface="Calibri"/>
+              </a:rPr>
+              <a:t>deed.de</a:t>
+            </a:r>
+            <a:endParaRPr sz="800" dirty="0">
+              <a:solidFill>
+                <a:schemeClr val="tx1">
+                  <a:lumMod val="65000"/>
+                  <a:lumOff val="35000"/>
+                </a:schemeClr>
+              </a:solidFill>
+              <a:latin typeface="Avenir Book" panose="02000503020000020003" pitchFamily="2" charset="0"/>
+              <a:ea typeface="Calibri"/>
+              <a:cs typeface="Avenir Light"/>
+              <a:sym typeface="Calibri"/>
+            </a:endParaRPr>
           </a:p>
         </p:txBody>
       </p:sp>
       <p:pic>
         <p:nvPicPr>
-          <p:cNvPr id="12" name="pasted-image.tif"/>
+          <p:cNvPr id="3" name="pasted-image.tif">
+            <a:extLst>
+              <a:ext uri="{FF2B5EF4-FFF2-40B4-BE49-F238E27FC236}">
+                <a16:creationId xmlns:a16="http://schemas.microsoft.com/office/drawing/2014/main" id="{6DDA73A9-C503-D3B3-6DC3-FB11132BCBB4}"/>
+              </a:ext>
+            </a:extLst>
+          </p:cNvPr>
           <p:cNvPicPr/>
           <p:nvPr/>
         </p:nvPicPr>
-        <p:blipFill>
-          <a:blip r:embed="rId4">
-            <a:extLst/>
-          </a:blip>
-          <a:stretch>
-            <a:fillRect/>
-          </a:stretch>
+        <p:blipFill rotWithShape="1">
+          <a:blip r:embed="rId4"/>
+          <a:srcRect r="24777" b="-3233"/>
+          <a:stretch/>
         </p:blipFill>
         <p:spPr>
           <a:xfrm>
-            <a:off x="6174185" y="4992838"/>
-            <a:ext cx="886619" cy="214128"/>
+            <a:off x="5724347" y="4733926"/>
+            <a:ext cx="1009828" cy="333374"/>
           </a:xfrm>
           <a:prstGeom prst="rect">
             <a:avLst/>
@@ -4524,58 +4488,6 @@
           </a:ln>
         </p:spPr>
       </p:pic>
-      <p:sp>
-        <p:nvSpPr>
-          <p:cNvPr id="13" name="Textfeld 12"/>
-          <p:cNvSpPr txBox="1"/>
-          <p:nvPr/>
-        </p:nvSpPr>
-        <p:spPr>
-          <a:xfrm>
-            <a:off x="239285" y="4936890"/>
-            <a:ext cx="1044856" cy="276999"/>
-          </a:xfrm>
-          <a:prstGeom prst="rect">
-            <a:avLst/>
-          </a:prstGeom>
-          <a:noFill/>
-        </p:spPr>
-        <p:txBody>
-          <a:bodyPr wrap="square" rtlCol="0">
-            <a:spAutoFit/>
-          </a:bodyPr>
-          <a:lstStyle/>
-          <a:p>
-            <a:r>
-              <a:rPr lang="de-DE" sz="600" dirty="0">
-                <a:solidFill>
-                  <a:srgbClr val="5D5E5F"/>
-                </a:solidFill>
-                <a:latin typeface="Avenir Light"/>
-                <a:cs typeface="Avenir Light"/>
-              </a:rPr>
-              <a:t>Letzte Änderung: </a:t>
-            </a:r>
-            <a:fld id="{7A8C7DAC-E536-564C-B5B3-90E8FAB50562}" type="datetime1">
-              <a:rPr lang="de-DE" sz="600" smtClean="0">
-                <a:solidFill>
-                  <a:srgbClr val="5D5E5F"/>
-                </a:solidFill>
-                <a:latin typeface="Avenir Light"/>
-                <a:cs typeface="Avenir Light"/>
-              </a:rPr>
-              <a:t>22.02.16</a:t>
-            </a:fld>
-            <a:endParaRPr lang="de-DE" sz="600" dirty="0">
-              <a:solidFill>
-                <a:srgbClr val="5D5E5F"/>
-              </a:solidFill>
-              <a:latin typeface="Avenir Light"/>
-              <a:cs typeface="Avenir Light"/>
-            </a:endParaRPr>
-          </a:p>
-        </p:txBody>
-      </p:sp>
     </p:spTree>
     <p:extLst>
       <p:ext uri="{BB962C8B-B14F-4D97-AF65-F5344CB8AC3E}">

</xml_diff>

<commit_message>
SCR 06 neue Lizenz eingepflegt
</commit_message>
<xml_diff>
--- a/training-cards/music moves/Scrum (SCR)/ger/apprentice/ger_SCR_06_Zeit_zum_Wachsen_MM_A.pptx
+++ b/training-cards/music moves/Scrum (SCR)/ger/apprentice/ger_SCR_06_Zeit_zum_Wachsen_MM_A.pptx
@@ -3555,8 +3555,29 @@
                 <a:latin typeface="Avenir Book"/>
                 <a:cs typeface="Avenir Book"/>
               </a:rPr>
-              <a:t>Mit jeder Retrofrage, die Du Dir stellst und ehrlich beantwortest, stärkst Du Deine Wahrnehmung und übernimmst die Verantwortung für Deinen Fortschritt.</a:t>
-            </a:r>
+              <a:t>Mit jeder Retrofrage, die Du Dir stellst und ehrlich beantwortest, stärkst Du Deine Wahrnehmung und übernimmst die Verantwortung für </a:t>
+            </a:r>
+            <a:r>
+              <a:rPr lang="de-DE" sz="1000">
+                <a:solidFill>
+                  <a:schemeClr val="bg1">
+                    <a:lumMod val="50000"/>
+                  </a:schemeClr>
+                </a:solidFill>
+                <a:latin typeface="Avenir Book"/>
+                <a:cs typeface="Avenir Book"/>
+              </a:rPr>
+              <a:t>Dein Wachsen.</a:t>
+            </a:r>
+            <a:endParaRPr lang="de-DE" sz="1000" dirty="0">
+              <a:solidFill>
+                <a:schemeClr val="bg1">
+                  <a:lumMod val="50000"/>
+                </a:schemeClr>
+              </a:solidFill>
+              <a:latin typeface="Avenir Book"/>
+              <a:cs typeface="Avenir Book"/>
+            </a:endParaRPr>
           </a:p>
         </p:txBody>
       </p:sp>
@@ -4205,7 +4226,7 @@
           </a:ln>
           <a:extLst>
             <a:ext uri="{C572A759-6A51-4108-AA02-DFA0A04FC94B}">
-              <ma14:wrappingTextBoxFlag xmlns="" xmlns:ma14="http://schemas.microsoft.com/office/mac/drawingml/2011/main" val="1"/>
+              <ma14:wrappingTextBoxFlag xmlns:ma14="http://schemas.microsoft.com/office/mac/drawingml/2011/main" xmlns="" val="1"/>
             </a:ext>
           </a:extLst>
         </p:spPr>

</xml_diff>

<commit_message>
SCR 06 Blocksatz und Quelle
</commit_message>
<xml_diff>
--- a/training-cards/music moves/Scrum (SCR)/ger/apprentice/ger_SCR_06_Zeit_zum_Wachsen_MM_A.pptx
+++ b/training-cards/music moves/Scrum (SCR)/ger/apprentice/ger_SCR_06_Zeit_zum_Wachsen_MM_A.pptx
@@ -303,7 +303,7 @@
           <a:p>
             <a:fld id="{B4A60231-500B-C44A-9B19-425C835AF47F}" type="datetimeFigureOut">
               <a:rPr lang="de-DE" smtClean="0"/>
-              <a:t>23.07.23</a:t>
+              <a:t>03.08.24</a:t>
             </a:fld>
             <a:endParaRPr lang="de-DE"/>
           </a:p>
@@ -471,7 +471,7 @@
           <a:p>
             <a:fld id="{B4A60231-500B-C44A-9B19-425C835AF47F}" type="datetimeFigureOut">
               <a:rPr lang="de-DE" smtClean="0"/>
-              <a:t>23.07.23</a:t>
+              <a:t>03.08.24</a:t>
             </a:fld>
             <a:endParaRPr lang="de-DE"/>
           </a:p>
@@ -649,7 +649,7 @@
           <a:p>
             <a:fld id="{B4A60231-500B-C44A-9B19-425C835AF47F}" type="datetimeFigureOut">
               <a:rPr lang="de-DE" smtClean="0"/>
-              <a:t>23.07.23</a:t>
+              <a:t>03.08.24</a:t>
             </a:fld>
             <a:endParaRPr lang="de-DE"/>
           </a:p>
@@ -817,7 +817,7 @@
           <a:p>
             <a:fld id="{B4A60231-500B-C44A-9B19-425C835AF47F}" type="datetimeFigureOut">
               <a:rPr lang="de-DE" smtClean="0"/>
-              <a:t>23.07.23</a:t>
+              <a:t>03.08.24</a:t>
             </a:fld>
             <a:endParaRPr lang="de-DE"/>
           </a:p>
@@ -1062,7 +1062,7 @@
           <a:p>
             <a:fld id="{B4A60231-500B-C44A-9B19-425C835AF47F}" type="datetimeFigureOut">
               <a:rPr lang="de-DE" smtClean="0"/>
-              <a:t>23.07.23</a:t>
+              <a:t>03.08.24</a:t>
             </a:fld>
             <a:endParaRPr lang="de-DE"/>
           </a:p>
@@ -1347,7 +1347,7 @@
           <a:p>
             <a:fld id="{B4A60231-500B-C44A-9B19-425C835AF47F}" type="datetimeFigureOut">
               <a:rPr lang="de-DE" smtClean="0"/>
-              <a:t>23.07.23</a:t>
+              <a:t>03.08.24</a:t>
             </a:fld>
             <a:endParaRPr lang="de-DE"/>
           </a:p>
@@ -1766,7 +1766,7 @@
           <a:p>
             <a:fld id="{B4A60231-500B-C44A-9B19-425C835AF47F}" type="datetimeFigureOut">
               <a:rPr lang="de-DE" smtClean="0"/>
-              <a:t>23.07.23</a:t>
+              <a:t>03.08.24</a:t>
             </a:fld>
             <a:endParaRPr lang="de-DE"/>
           </a:p>
@@ -1883,7 +1883,7 @@
           <a:p>
             <a:fld id="{B4A60231-500B-C44A-9B19-425C835AF47F}" type="datetimeFigureOut">
               <a:rPr lang="de-DE" smtClean="0"/>
-              <a:t>23.07.23</a:t>
+              <a:t>03.08.24</a:t>
             </a:fld>
             <a:endParaRPr lang="de-DE"/>
           </a:p>
@@ -1978,7 +1978,7 @@
           <a:p>
             <a:fld id="{B4A60231-500B-C44A-9B19-425C835AF47F}" type="datetimeFigureOut">
               <a:rPr lang="de-DE" smtClean="0"/>
-              <a:t>23.07.23</a:t>
+              <a:t>03.08.24</a:t>
             </a:fld>
             <a:endParaRPr lang="de-DE"/>
           </a:p>
@@ -2253,7 +2253,7 @@
           <a:p>
             <a:fld id="{B4A60231-500B-C44A-9B19-425C835AF47F}" type="datetimeFigureOut">
               <a:rPr lang="de-DE" smtClean="0"/>
-              <a:t>23.07.23</a:t>
+              <a:t>03.08.24</a:t>
             </a:fld>
             <a:endParaRPr lang="de-DE"/>
           </a:p>
@@ -2505,7 +2505,7 @@
           <a:p>
             <a:fld id="{B4A60231-500B-C44A-9B19-425C835AF47F}" type="datetimeFigureOut">
               <a:rPr lang="de-DE" smtClean="0"/>
-              <a:t>23.07.23</a:t>
+              <a:t>03.08.24</a:t>
             </a:fld>
             <a:endParaRPr lang="de-DE"/>
           </a:p>
@@ -2716,7 +2716,7 @@
           <a:p>
             <a:fld id="{B4A60231-500B-C44A-9B19-425C835AF47F}" type="datetimeFigureOut">
               <a:rPr lang="de-DE" smtClean="0"/>
-              <a:t>23.07.23</a:t>
+              <a:t>03.08.24</a:t>
             </a:fld>
             <a:endParaRPr lang="de-DE"/>
           </a:p>
@@ -3327,7 +3327,7 @@
         <p:spPr>
           <a:xfrm>
             <a:off x="865450" y="1584056"/>
-            <a:ext cx="5942053" cy="3323987"/>
+            <a:ext cx="5942053" cy="3477875"/>
           </a:xfrm>
           <a:prstGeom prst="rect">
             <a:avLst/>
@@ -3345,7 +3345,7 @@
           </a:bodyPr>
           <a:lstStyle/>
           <a:p>
-            <a:pPr marL="271463" lvl="0" indent="-271463">
+            <a:pPr marL="271463" lvl="0" indent="-271463" algn="just">
               <a:buSzPct val="170000"/>
               <a:buBlip>
                 <a:blip r:embed="rId3"/>
@@ -3361,7 +3361,7 @@
                 <a:latin typeface="Avenir Book"/>
                 <a:cs typeface="Avenir Book"/>
               </a:rPr>
-              <a:t>Die Sprint Retrospektive dient dem </a:t>
+              <a:t>Die sog. „Sprint Retrospektive“, ist ein Treffen, das dem </a:t>
             </a:r>
             <a:r>
               <a:rPr lang="de-DE" sz="1000" dirty="0" err="1">
@@ -3385,11 +3385,50 @@
                 <a:latin typeface="Avenir Book"/>
                 <a:cs typeface="Avenir Book"/>
               </a:rPr>
-              <a:t>-Team dazu, sich Zeit zur Reflektion zu nehmen, um mögliche Verbesserungen für künftige Sprints zu entdecken. </a:t>
-            </a:r>
-          </a:p>
-          <a:p>
-            <a:pPr lvl="0">
+              <a:t>-Team Zeit zur Reflektion gibt, um mögliche die Qualität zu verbessern und die Effizienz für künftige Sprints zu steigern </a:t>
+            </a:r>
+            <a:r>
+              <a:rPr lang="de-DE" sz="1000" dirty="0">
+                <a:solidFill>
+                  <a:srgbClr val="747982"/>
+                </a:solidFill>
+                <a:latin typeface="Avenir Book"/>
+                <a:cs typeface="Avenir Book"/>
+              </a:rPr>
+              <a:t>(vgl. </a:t>
+            </a:r>
+            <a:r>
+              <a:rPr lang="de-DE" sz="1000" dirty="0" err="1">
+                <a:solidFill>
+                  <a:srgbClr val="747982"/>
+                </a:solidFill>
+                <a:latin typeface="Avenir Book"/>
+                <a:cs typeface="Avenir Book"/>
+              </a:rPr>
+              <a:t>Schwaber</a:t>
+            </a:r>
+            <a:r>
+              <a:rPr lang="de-DE" sz="1000" dirty="0">
+                <a:solidFill>
+                  <a:srgbClr val="747982"/>
+                </a:solidFill>
+                <a:latin typeface="Avenir Book"/>
+                <a:cs typeface="Avenir Book"/>
+              </a:rPr>
+              <a:t>/Sutherland 2020, S. 10).</a:t>
+            </a:r>
+            <a:endParaRPr lang="de-DE" sz="1000" dirty="0">
+              <a:solidFill>
+                <a:schemeClr val="bg1">
+                  <a:lumMod val="50000"/>
+                </a:schemeClr>
+              </a:solidFill>
+              <a:latin typeface="Avenir Book"/>
+              <a:cs typeface="Avenir Book"/>
+            </a:endParaRPr>
+          </a:p>
+          <a:p>
+            <a:pPr lvl="0" algn="just">
               <a:buSzPct val="170000"/>
             </a:pPr>
             <a:endParaRPr lang="de-DE" sz="1000" dirty="0">
@@ -3403,7 +3442,7 @@
             </a:endParaRPr>
           </a:p>
           <a:p>
-            <a:pPr marL="271463" lvl="0" indent="-271463">
+            <a:pPr marL="271463" lvl="0" indent="-271463" algn="just">
               <a:buSzPct val="170000"/>
               <a:buBlip>
                 <a:blip r:embed="rId3"/>
@@ -3419,11 +3458,35 @@
                 <a:latin typeface="Avenir Book"/>
                 <a:cs typeface="Avenir Book"/>
               </a:rPr>
-              <a:t>Das Treffen ist auf drei Stunden für einmonatige Sprints beschränkt. Die Zeit verringert sich proportional zur Verkürzung des Sprints.</a:t>
-            </a:r>
-          </a:p>
-          <a:p>
-            <a:pPr lvl="0">
+              <a:t>Die Sprint Retrospektive beendet den Sprint. Danach beginnt sofort eine neuer Sprint, an dessen Anfang ein Sprint </a:t>
+            </a:r>
+            <a:r>
+              <a:rPr lang="de-DE" sz="1000" dirty="0" err="1">
+                <a:solidFill>
+                  <a:schemeClr val="bg1">
+                    <a:lumMod val="50000"/>
+                  </a:schemeClr>
+                </a:solidFill>
+                <a:latin typeface="Avenir Book"/>
+                <a:cs typeface="Avenir Book"/>
+              </a:rPr>
+              <a:t>Planning</a:t>
+            </a:r>
+            <a:r>
+              <a:rPr lang="de-DE" sz="1000" dirty="0">
+                <a:solidFill>
+                  <a:schemeClr val="bg1">
+                    <a:lumMod val="50000"/>
+                  </a:schemeClr>
+                </a:solidFill>
+                <a:latin typeface="Avenir Book"/>
+                <a:cs typeface="Avenir Book"/>
+              </a:rPr>
+              <a:t> (SCR 05) steht.</a:t>
+            </a:r>
+          </a:p>
+          <a:p>
+            <a:pPr lvl="0" algn="just">
               <a:buSzPct val="170000"/>
             </a:pPr>
             <a:endParaRPr lang="de-DE" sz="1000" dirty="0">
@@ -3437,7 +3500,7 @@
             </a:endParaRPr>
           </a:p>
           <a:p>
-            <a:pPr marL="271463" lvl="0" indent="-271463">
+            <a:pPr marL="271463" lvl="0" indent="-271463" algn="just">
               <a:buSzPct val="170000"/>
               <a:buBlip>
                 <a:blip r:embed="rId3"/>
@@ -3457,7 +3520,7 @@
             </a:r>
           </a:p>
           <a:p>
-            <a:pPr lvl="0">
+            <a:pPr lvl="0" algn="just">
               <a:buSzPct val="170000"/>
             </a:pPr>
             <a:endParaRPr lang="de-DE" sz="1000" dirty="0">
@@ -3471,7 +3534,7 @@
             </a:endParaRPr>
           </a:p>
           <a:p>
-            <a:pPr marL="271463" lvl="0" indent="-271463">
+            <a:pPr marL="271463" lvl="0" indent="-271463" algn="just">
               <a:buSzPct val="170000"/>
               <a:buBlip>
                 <a:blip r:embed="rId3"/>
@@ -3487,11 +3550,11 @@
                 <a:latin typeface="Avenir Book"/>
                 <a:cs typeface="Avenir Book"/>
               </a:rPr>
-              <a:t>Zeit einzuplanen, in der Du Dir immer wieder neu Rahmenbedingungen für gesundes Lernen schaffst, aus Deinen Fehlern lernst, wahrnimmst, was Deine größten Hindernisse und Lösungen dafür sind, steigert Deine Selbstwirksamkeit und gibt Dir als Mensch mehr Wert.  </a:t>
-            </a:r>
-          </a:p>
-          <a:p>
-            <a:pPr lvl="0">
+              <a:t>Zeit einzuplanen, in der Du Dir immer wieder neu Rahmenbedingungen für gesundes Lernen schaffst, aus Deinen Fehlern lernst, wahrnimmst, was Deine größten Hindernisse und Lösungen dafür sind, steigert Deine Selbstwirksamkeit.  </a:t>
+            </a:r>
+          </a:p>
+          <a:p>
+            <a:pPr lvl="0" algn="just">
               <a:buSzPct val="170000"/>
             </a:pPr>
             <a:endParaRPr lang="de-DE" sz="1000" dirty="0">
@@ -3505,7 +3568,7 @@
             </a:endParaRPr>
           </a:p>
           <a:p>
-            <a:pPr marL="271463" lvl="0" indent="-271463">
+            <a:pPr marL="271463" lvl="0" indent="-271463" algn="just">
               <a:buSzPct val="170000"/>
               <a:buBlip>
                 <a:blip r:embed="rId3"/>
@@ -3525,7 +3588,7 @@
             </a:r>
           </a:p>
           <a:p>
-            <a:pPr lvl="0">
+            <a:pPr lvl="0" algn="just">
               <a:buSzPct val="170000"/>
             </a:pPr>
             <a:endParaRPr lang="de-DE" sz="1000" dirty="0">
@@ -3539,7 +3602,7 @@
             </a:endParaRPr>
           </a:p>
           <a:p>
-            <a:pPr marL="271463" lvl="0" indent="-271463">
+            <a:pPr marL="271463" lvl="0" indent="-271463" algn="just">
               <a:buSzPct val="170000"/>
               <a:buBlip>
                 <a:blip r:embed="rId3"/>
@@ -3555,29 +3618,8 @@
                 <a:latin typeface="Avenir Book"/>
                 <a:cs typeface="Avenir Book"/>
               </a:rPr>
-              <a:t>Mit jeder Retrofrage, die Du Dir stellst und ehrlich beantwortest, stärkst Du Deine Wahrnehmung und übernimmst die Verantwortung für </a:t>
-            </a:r>
-            <a:r>
-              <a:rPr lang="de-DE" sz="1000">
-                <a:solidFill>
-                  <a:schemeClr val="bg1">
-                    <a:lumMod val="50000"/>
-                  </a:schemeClr>
-                </a:solidFill>
-                <a:latin typeface="Avenir Book"/>
-                <a:cs typeface="Avenir Book"/>
-              </a:rPr>
-              <a:t>Dein Wachsen.</a:t>
-            </a:r>
-            <a:endParaRPr lang="de-DE" sz="1000" dirty="0">
-              <a:solidFill>
-                <a:schemeClr val="bg1">
-                  <a:lumMod val="50000"/>
-                </a:schemeClr>
-              </a:solidFill>
-              <a:latin typeface="Avenir Book"/>
-              <a:cs typeface="Avenir Book"/>
-            </a:endParaRPr>
+              <a:t>Mit jeder Retrofrage, die Du Dir stellst und ehrlich beantwortest, stärkst Du Deine Wahrnehmung und übernimmst die Verantwortung für Dein Wachstum.</a:t>
+            </a:r>
           </a:p>
         </p:txBody>
       </p:sp>
@@ -3917,7 +3959,7 @@
           </a:bodyPr>
           <a:lstStyle/>
           <a:p>
-            <a:pPr marL="271463" indent="-271463">
+            <a:pPr marL="271463" indent="-271463" algn="just">
               <a:buSzPct val="170000"/>
               <a:buBlip>
                 <a:blip r:embed="rId3"/>
@@ -3931,11 +3973,31 @@
                 <a:latin typeface="Avenir Book"/>
                 <a:cs typeface="Avenir Book"/>
               </a:rPr>
-              <a:t>Setze Dich nach einem Sprint mit Deinem Team für eine Retro zusammen. Wiederhole das zwei Mal jeweils verbunden mit einem Sprintende.</a:t>
-            </a:r>
-          </a:p>
-          <a:p>
-            <a:pPr>
+              <a:t>Setze Dich nach einem Sprint mit Deinem Team für eine </a:t>
+            </a:r>
+            <a:r>
+              <a:rPr lang="de-DE" sz="1000" dirty="0" err="1">
+                <a:solidFill>
+                  <a:srgbClr val="7F7F7F"/>
+                </a:solidFill>
+                <a:latin typeface="Avenir Book"/>
+                <a:cs typeface="Avenir Book"/>
+              </a:rPr>
+              <a:t>Scrum</a:t>
+            </a:r>
+            <a:r>
+              <a:rPr lang="de-DE" sz="1000" dirty="0">
+                <a:solidFill>
+                  <a:srgbClr val="7F7F7F"/>
+                </a:solidFill>
+                <a:latin typeface="Avenir Book"/>
+                <a:cs typeface="Avenir Book"/>
+              </a:rPr>
+              <a:t> Retrospektive zusammen. Wiederhole das 2 Mal jeweils verbunden mit einem Sprintende.</a:t>
+            </a:r>
+          </a:p>
+          <a:p>
+            <a:pPr algn="just">
               <a:buSzPct val="170000"/>
             </a:pPr>
             <a:endParaRPr lang="de-DE" sz="1000" dirty="0">
@@ -3947,7 +4009,7 @@
             </a:endParaRPr>
           </a:p>
           <a:p>
-            <a:pPr marL="271463" indent="-271463">
+            <a:pPr marL="271463" indent="-271463" algn="just">
               <a:buSzPct val="170000"/>
               <a:buBlip>
                 <a:blip r:embed="rId3"/>
@@ -3965,7 +4027,7 @@
             </a:r>
           </a:p>
           <a:p>
-            <a:pPr>
+            <a:pPr algn="just">
               <a:buSzPct val="170000"/>
             </a:pPr>
             <a:endParaRPr lang="de-DE" sz="1000" dirty="0">
@@ -3977,7 +4039,7 @@
             </a:endParaRPr>
           </a:p>
           <a:p>
-            <a:pPr marL="271463" indent="-271463">
+            <a:pPr marL="271463" indent="-271463" algn="just">
               <a:buSzPct val="170000"/>
               <a:buBlip>
                 <a:blip r:embed="rId3"/>
@@ -4011,17 +4073,17 @@
                 <a:latin typeface="Avenir Book"/>
                 <a:cs typeface="Avenir Book"/>
               </a:rPr>
-              <a:t> findest Du viele Wahrnehmungsfragen (</a:t>
-            </a:r>
-            <a:r>
-              <a:rPr lang="de-DE" sz="1000" u="sng" dirty="0" err="1">
-                <a:solidFill>
-                  <a:srgbClr val="820667"/>
+              <a:t> (vgl. Baldauf/</a:t>
+            </a:r>
+            <a:r>
+              <a:rPr lang="de-DE" sz="1000" dirty="0" err="1">
+                <a:solidFill>
+                  <a:srgbClr val="7F7F7F"/>
                 </a:solidFill>
                 <a:latin typeface="Avenir Book"/>
                 <a:cs typeface="Avenir Book"/>
               </a:rPr>
-              <a:t>www.plans-for-retrospectives.com</a:t>
+              <a:t>Fiddike</a:t>
             </a:r>
             <a:r>
               <a:rPr lang="de-DE" sz="1000" dirty="0">
@@ -4031,11 +4093,11 @@
                 <a:latin typeface="Avenir Book"/>
                 <a:cs typeface="Avenir Book"/>
               </a:rPr>
-              <a:t>), die Dir bei Deiner Reflektion helfen. </a:t>
-            </a:r>
-          </a:p>
-          <a:p>
-            <a:pPr>
+              <a:t> 2023) findest Du viele Wahrnehmungsfragen, die Dir bei Deiner Reflektion helfen. </a:t>
+            </a:r>
+          </a:p>
+          <a:p>
+            <a:pPr algn="just">
               <a:buSzPct val="170000"/>
             </a:pPr>
             <a:endParaRPr lang="de-DE" sz="1000" dirty="0">
@@ -4047,7 +4109,7 @@
             </a:endParaRPr>
           </a:p>
           <a:p>
-            <a:pPr marL="271463" indent="-271463">
+            <a:pPr marL="271463" indent="-271463" algn="just">
               <a:buSzPct val="170000"/>
               <a:buBlip>
                 <a:blip r:embed="rId3"/>
@@ -4105,7 +4167,7 @@
             </a:r>
           </a:p>
           <a:p>
-            <a:pPr>
+            <a:pPr algn="just">
               <a:buSzPct val="170000"/>
             </a:pPr>
             <a:endParaRPr lang="de-DE" sz="1000" dirty="0">
@@ -4117,7 +4179,7 @@
             </a:endParaRPr>
           </a:p>
           <a:p>
-            <a:pPr marL="271463" indent="-271463">
+            <a:pPr marL="271463" indent="-271463" algn="just">
               <a:buSzPct val="170000"/>
               <a:buBlip>
                 <a:blip r:embed="rId3"/>
@@ -4131,27 +4193,7 @@
                 <a:latin typeface="Avenir Book"/>
                 <a:cs typeface="Avenir Book"/>
               </a:rPr>
-              <a:t>Wenn Du nur für Dich selbst übst, ist eine Retro mit anderen Kollegen, die ohne Team üben, sehr hilfreich um Zeugen zu haben, wie Du Dein Training anpassen willst. Das fordert von Dir, Deine eigenen Vorsätze ernster zu nehmen, weil Du weißt, dass Du Dir und </a:t>
-            </a:r>
-            <a:r>
-              <a:rPr lang="de-DE" sz="1000">
-                <a:solidFill>
-                  <a:srgbClr val="7F7F7F"/>
-                </a:solidFill>
-                <a:latin typeface="Avenir Book"/>
-                <a:cs typeface="Avenir Book"/>
-              </a:rPr>
-              <a:t>Ihnen gegenüber von </a:t>
-            </a:r>
-            <a:r>
-              <a:rPr lang="de-DE" sz="1000" dirty="0">
-                <a:solidFill>
-                  <a:srgbClr val="7F7F7F"/>
-                </a:solidFill>
-                <a:latin typeface="Avenir Book"/>
-                <a:cs typeface="Avenir Book"/>
-              </a:rPr>
-              <a:t>Zeit zu Zeit Rechenschaft ablegst.</a:t>
+              <a:t>Wenn Du nur für Dich selbst übst, ist eine Retro mit anderen Kollegen, die ohne Team üben, sehr hilfreich um Zeugen zu haben, wie Du Dein Training anpassen willst. Das fordert von Dir, Deine eigenen Vorsätze ernster zu nehmen, weil Du weißt, dass Du Dir und Ihnen gegenüber von Zeit zu Zeit Rechenschaft ablegst.</a:t>
             </a:r>
           </a:p>
         </p:txBody>
@@ -4226,7 +4268,7 @@
           </a:ln>
           <a:extLst>
             <a:ext uri="{C572A759-6A51-4108-AA02-DFA0A04FC94B}">
-              <ma14:wrappingTextBoxFlag xmlns:ma14="http://schemas.microsoft.com/office/mac/drawingml/2011/main" xmlns="" val="1"/>
+              <ma14:wrappingTextBoxFlag xmlns="" xmlns:ma14="http://schemas.microsoft.com/office/mac/drawingml/2011/main" val="1"/>
             </a:ext>
           </a:extLst>
         </p:spPr>
@@ -4509,6 +4551,169 @@
           </a:ln>
         </p:spPr>
       </p:pic>
+      <p:sp>
+        <p:nvSpPr>
+          <p:cNvPr id="11" name="Textfeld 10">
+            <a:extLst>
+              <a:ext uri="{FF2B5EF4-FFF2-40B4-BE49-F238E27FC236}">
+                <a16:creationId xmlns:a16="http://schemas.microsoft.com/office/drawing/2014/main" id="{542A82A4-E81B-DCD4-663B-0D9DB6AEBEA2}"/>
+              </a:ext>
+            </a:extLst>
+          </p:cNvPr>
+          <p:cNvSpPr txBox="1"/>
+          <p:nvPr/>
+        </p:nvSpPr>
+        <p:spPr>
+          <a:xfrm>
+            <a:off x="865450" y="4361145"/>
+            <a:ext cx="5732660" cy="215444"/>
+          </a:xfrm>
+          <a:prstGeom prst="rect">
+            <a:avLst/>
+          </a:prstGeom>
+          <a:noFill/>
+        </p:spPr>
+        <p:txBody>
+          <a:bodyPr wrap="none" rtlCol="0">
+            <a:spAutoFit/>
+          </a:bodyPr>
+          <a:lstStyle/>
+          <a:p>
+            <a:r>
+              <a:rPr lang="en-US" sz="800" b="1" dirty="0">
+                <a:solidFill>
+                  <a:schemeClr val="tx1">
+                    <a:lumMod val="65000"/>
+                    <a:lumOff val="35000"/>
+                  </a:schemeClr>
+                </a:solidFill>
+              </a:rPr>
+              <a:t>Quelle: </a:t>
+            </a:r>
+            <a:r>
+              <a:rPr lang="en-US" sz="800" b="1" dirty="0" err="1">
+                <a:solidFill>
+                  <a:schemeClr val="tx1">
+                    <a:lumMod val="65000"/>
+                    <a:lumOff val="35000"/>
+                  </a:schemeClr>
+                </a:solidFill>
+              </a:rPr>
+              <a:t>Baldauf</a:t>
+            </a:r>
+            <a:r>
+              <a:rPr lang="en-US" sz="800" dirty="0">
+                <a:solidFill>
+                  <a:schemeClr val="tx1">
+                    <a:lumMod val="65000"/>
+                    <a:lumOff val="35000"/>
+                  </a:schemeClr>
+                </a:solidFill>
+              </a:rPr>
+              <a:t>, Corinna/</a:t>
+            </a:r>
+            <a:r>
+              <a:rPr lang="en-US" sz="800" dirty="0" err="1">
+                <a:solidFill>
+                  <a:schemeClr val="tx1">
+                    <a:lumMod val="65000"/>
+                    <a:lumOff val="35000"/>
+                  </a:schemeClr>
+                </a:solidFill>
+              </a:rPr>
+              <a:t>Fiddike</a:t>
+            </a:r>
+            <a:r>
+              <a:rPr lang="en-US" sz="800" dirty="0">
+                <a:solidFill>
+                  <a:schemeClr val="tx1">
+                    <a:lumMod val="65000"/>
+                    <a:lumOff val="35000"/>
+                  </a:schemeClr>
+                </a:solidFill>
+              </a:rPr>
+              <a:t>, Timon (</a:t>
+            </a:r>
+            <a:r>
+              <a:rPr lang="en-US" sz="800">
+                <a:solidFill>
+                  <a:schemeClr val="tx1">
+                    <a:lumMod val="65000"/>
+                    <a:lumOff val="35000"/>
+                  </a:schemeClr>
+                </a:solidFill>
+              </a:rPr>
+              <a:t>2023): </a:t>
+            </a:r>
+            <a:r>
+              <a:rPr lang="en-US" sz="800" dirty="0" err="1">
+                <a:solidFill>
+                  <a:schemeClr val="tx1">
+                    <a:lumMod val="65000"/>
+                    <a:lumOff val="35000"/>
+                  </a:schemeClr>
+                </a:solidFill>
+              </a:rPr>
+              <a:t>Retromat</a:t>
+            </a:r>
+            <a:r>
+              <a:rPr lang="en-US" sz="800" dirty="0">
+                <a:solidFill>
+                  <a:schemeClr val="tx1">
+                    <a:lumMod val="65000"/>
+                    <a:lumOff val="35000"/>
+                  </a:schemeClr>
+                </a:solidFill>
+              </a:rPr>
+              <a:t>: Create Your Program. https://</a:t>
+            </a:r>
+            <a:r>
+              <a:rPr lang="en-US" sz="800" dirty="0" err="1">
+                <a:solidFill>
+                  <a:schemeClr val="tx1">
+                    <a:lumMod val="65000"/>
+                    <a:lumOff val="35000"/>
+                  </a:schemeClr>
+                </a:solidFill>
+              </a:rPr>
+              <a:t>retromat.org</a:t>
+            </a:r>
+            <a:r>
+              <a:rPr lang="en-US" sz="800" dirty="0">
+                <a:solidFill>
+                  <a:schemeClr val="tx1">
+                    <a:lumMod val="65000"/>
+                    <a:lumOff val="35000"/>
+                  </a:schemeClr>
+                </a:solidFill>
+              </a:rPr>
+              <a:t>. </a:t>
+            </a:r>
+            <a:r>
+              <a:rPr lang="en-US" sz="800" dirty="0" err="1">
+                <a:solidFill>
+                  <a:schemeClr val="tx1">
+                    <a:lumMod val="65000"/>
+                    <a:lumOff val="35000"/>
+                  </a:schemeClr>
+                </a:solidFill>
+              </a:rPr>
+              <a:t>Abgerufen</a:t>
+            </a:r>
+            <a:r>
+              <a:rPr lang="en-US" sz="800" dirty="0">
+                <a:solidFill>
+                  <a:schemeClr val="tx1">
+                    <a:lumMod val="65000"/>
+                    <a:lumOff val="35000"/>
+                  </a:schemeClr>
+                </a:solidFill>
+              </a:rPr>
+              <a:t> am: 3. August 2024 </a:t>
+            </a:r>
+          </a:p>
+        </p:txBody>
+      </p:sp>
     </p:spTree>
     <p:extLst>
       <p:ext uri="{BB962C8B-B14F-4D97-AF65-F5344CB8AC3E}">

</xml_diff>